<commit_message>
diagram 및 description 최종 수정
</commit_message>
<xml_diff>
--- a/use_case_diagram_UI_B711152.pptx
+++ b/use_case_diagram_UI_B711152.pptx
@@ -5,13 +5,14 @@
     <p:sldMasterId id="2147483648" r:id="rId1"/>
   </p:sldMasterIdLst>
   <p:notesMasterIdLst>
-    <p:notesMasterId r:id="rId6"/>
+    <p:notesMasterId r:id="rId7"/>
   </p:notesMasterIdLst>
   <p:sldIdLst>
     <p:sldId id="256" r:id="rId2"/>
     <p:sldId id="257" r:id="rId3"/>
     <p:sldId id="258" r:id="rId4"/>
     <p:sldId id="259" r:id="rId5"/>
+    <p:sldId id="260" r:id="rId6"/>
   </p:sldIdLst>
   <p:sldSz cx="9144000" cy="6858000" type="screen4x3"/>
   <p:notesSz cx="6858000" cy="9144000"/>
@@ -694,7 +695,19 @@
           <a:p>
             <a:r>
               <a:rPr lang="ko-KR" altLang="en-US" dirty="0" smtClean="0"/>
-              <a:t>판매 완료 상품 조회</a:t>
+              <a:t>판매 중인 상품 조회 </a:t>
+            </a:r>
+            <a:r>
+              <a:rPr lang="en-US" altLang="ko-KR" dirty="0" smtClean="0"/>
+              <a:t>/ </a:t>
+            </a:r>
+            <a:r>
+              <a:rPr lang="ko-KR" altLang="en-US" dirty="0" smtClean="0"/>
+              <a:t>판매 </a:t>
+            </a:r>
+            <a:r>
+              <a:rPr lang="ko-KR" altLang="en-US" dirty="0" smtClean="0"/>
+              <a:t>완료 상품 조회</a:t>
             </a:r>
             <a:r>
               <a:rPr lang="en-US" altLang="ko-KR" dirty="0" smtClean="0"/>
@@ -804,11 +817,7 @@
             </a:r>
             <a:r>
               <a:rPr lang="ko-KR" altLang="en-US" baseline="0" dirty="0" smtClean="0"/>
-              <a:t>구매내역 직접 </a:t>
-            </a:r>
-            <a:r>
-              <a:rPr lang="ko-KR" altLang="en-US" baseline="0" dirty="0" smtClean="0"/>
-              <a:t>삭제 </a:t>
+              <a:t>구매내역 직접 삭제 </a:t>
             </a:r>
             <a:r>
               <a:rPr lang="en-US" altLang="ko-KR" baseline="0" dirty="0" smtClean="0"/>
@@ -873,6 +882,92 @@
               <a:rPr lang="ko-KR" altLang="en-US" smtClean="0"/>
               <a:pPr/>
               <a:t>4</a:t>
+            </a:fld>
+            <a:endParaRPr lang="ko-KR" altLang="en-US"/>
+          </a:p>
+        </p:txBody>
+      </p:sp>
+    </p:spTree>
+  </p:cSld>
+  <p:clrMapOvr>
+    <a:masterClrMapping/>
+  </p:clrMapOvr>
+</p:notes>
+</file>
+
+<file path=ppt/notesSlides/notesSlide5.xml><?xml version="1.0" encoding="utf-8"?>
+<p:notes xmlns:a="http://schemas.openxmlformats.org/drawingml/2006/main" xmlns:r="http://schemas.openxmlformats.org/officeDocument/2006/relationships" xmlns:p="http://schemas.openxmlformats.org/presentationml/2006/main">
+  <p:cSld>
+    <p:spTree>
+      <p:nvGrpSpPr>
+        <p:cNvPr id="1" name=""/>
+        <p:cNvGrpSpPr/>
+        <p:nvPr/>
+      </p:nvGrpSpPr>
+      <p:grpSpPr>
+        <a:xfrm>
+          <a:off x="0" y="0"/>
+          <a:ext cx="0" cy="0"/>
+          <a:chOff x="0" y="0"/>
+          <a:chExt cx="0" cy="0"/>
+        </a:xfrm>
+      </p:grpSpPr>
+      <p:sp>
+        <p:nvSpPr>
+          <p:cNvPr id="2" name="슬라이드 이미지 개체 틀 1"/>
+          <p:cNvSpPr>
+            <a:spLocks noGrp="1" noRot="1" noChangeAspect="1"/>
+          </p:cNvSpPr>
+          <p:nvPr>
+            <p:ph type="sldImg"/>
+          </p:nvPr>
+        </p:nvSpPr>
+        <p:spPr/>
+      </p:sp>
+      <p:sp>
+        <p:nvSpPr>
+          <p:cNvPr id="3" name="슬라이드 노트 개체 틀 2"/>
+          <p:cNvSpPr>
+            <a:spLocks noGrp="1"/>
+          </p:cNvSpPr>
+          <p:nvPr>
+            <p:ph type="body" idx="1"/>
+          </p:nvPr>
+        </p:nvSpPr>
+        <p:spPr/>
+        <p:txBody>
+          <a:bodyPr>
+            <a:normAutofit/>
+          </a:bodyPr>
+          <a:lstStyle/>
+          <a:p>
+            <a:r>
+              <a:rPr lang="ko-KR" altLang="en-US" dirty="0" smtClean="0"/>
+              <a:t>상품 구매만족도 평가</a:t>
+            </a:r>
+            <a:endParaRPr lang="ko-KR" altLang="en-US" dirty="0"/>
+          </a:p>
+        </p:txBody>
+      </p:sp>
+      <p:sp>
+        <p:nvSpPr>
+          <p:cNvPr id="4" name="슬라이드 번호 개체 틀 3"/>
+          <p:cNvSpPr>
+            <a:spLocks noGrp="1"/>
+          </p:cNvSpPr>
+          <p:nvPr>
+            <p:ph type="sldNum" sz="quarter" idx="10"/>
+          </p:nvPr>
+        </p:nvSpPr>
+        <p:spPr/>
+        <p:txBody>
+          <a:bodyPr/>
+          <a:lstStyle/>
+          <a:p>
+            <a:fld id="{E75228C3-9EB1-4547-8C5A-D4ED6CFEBF9E}" type="slidenum">
+              <a:rPr lang="ko-KR" altLang="en-US" smtClean="0"/>
+              <a:pPr/>
+              <a:t>5</a:t>
             </a:fld>
             <a:endParaRPr lang="ko-KR" altLang="en-US"/>
           </a:p>
@@ -4049,177 +4144,6 @@
           </a:p>
         </p:txBody>
       </p:sp>
-      <p:sp>
-        <p:nvSpPr>
-          <p:cNvPr id="55" name="타원 54"/>
-          <p:cNvSpPr/>
-          <p:nvPr/>
-        </p:nvSpPr>
-        <p:spPr>
-          <a:xfrm>
-            <a:off x="2771800" y="332656"/>
-            <a:ext cx="1440160" cy="648072"/>
-          </a:xfrm>
-          <a:prstGeom prst="ellipse">
-            <a:avLst/>
-          </a:prstGeom>
-        </p:spPr>
-        <p:style>
-          <a:lnRef idx="2">
-            <a:schemeClr val="dk1"/>
-          </a:lnRef>
-          <a:fillRef idx="1">
-            <a:schemeClr val="lt1"/>
-          </a:fillRef>
-          <a:effectRef idx="0">
-            <a:schemeClr val="dk1"/>
-          </a:effectRef>
-          <a:fontRef idx="minor">
-            <a:schemeClr val="dk1"/>
-          </a:fontRef>
-        </p:style>
-        <p:txBody>
-          <a:bodyPr rtlCol="0" anchor="ctr"/>
-          <a:lstStyle/>
-          <a:p>
-            <a:pPr algn="ctr"/>
-            <a:r>
-              <a:rPr lang="ko-KR" altLang="en-US" sz="1200" dirty="0" smtClean="0"/>
-              <a:t>회원 가입</a:t>
-            </a:r>
-            <a:endParaRPr lang="ko-KR" altLang="en-US" sz="1200" dirty="0"/>
-          </a:p>
-        </p:txBody>
-      </p:sp>
-      <p:sp>
-        <p:nvSpPr>
-          <p:cNvPr id="56" name="타원 55"/>
-          <p:cNvSpPr/>
-          <p:nvPr/>
-        </p:nvSpPr>
-        <p:spPr>
-          <a:xfrm>
-            <a:off x="2771800" y="1052736"/>
-            <a:ext cx="1440160" cy="648072"/>
-          </a:xfrm>
-          <a:prstGeom prst="ellipse">
-            <a:avLst/>
-          </a:prstGeom>
-        </p:spPr>
-        <p:style>
-          <a:lnRef idx="2">
-            <a:schemeClr val="dk1"/>
-          </a:lnRef>
-          <a:fillRef idx="1">
-            <a:schemeClr val="lt1"/>
-          </a:fillRef>
-          <a:effectRef idx="0">
-            <a:schemeClr val="dk1"/>
-          </a:effectRef>
-          <a:fontRef idx="minor">
-            <a:schemeClr val="dk1"/>
-          </a:fontRef>
-        </p:style>
-        <p:txBody>
-          <a:bodyPr rtlCol="0" anchor="ctr"/>
-          <a:lstStyle/>
-          <a:p>
-            <a:pPr algn="ctr"/>
-            <a:r>
-              <a:rPr lang="ko-KR" altLang="en-US" sz="1200" dirty="0" smtClean="0"/>
-              <a:t>회원 탈퇴</a:t>
-            </a:r>
-            <a:endParaRPr lang="ko-KR" altLang="en-US" sz="1200" dirty="0"/>
-          </a:p>
-        </p:txBody>
-      </p:sp>
-      <p:sp>
-        <p:nvSpPr>
-          <p:cNvPr id="57" name="타원 56"/>
-          <p:cNvSpPr/>
-          <p:nvPr/>
-        </p:nvSpPr>
-        <p:spPr>
-          <a:xfrm>
-            <a:off x="2771800" y="1772816"/>
-            <a:ext cx="1440160" cy="648072"/>
-          </a:xfrm>
-          <a:prstGeom prst="ellipse">
-            <a:avLst/>
-          </a:prstGeom>
-        </p:spPr>
-        <p:style>
-          <a:lnRef idx="2">
-            <a:schemeClr val="dk1"/>
-          </a:lnRef>
-          <a:fillRef idx="1">
-            <a:schemeClr val="lt1"/>
-          </a:fillRef>
-          <a:effectRef idx="0">
-            <a:schemeClr val="dk1"/>
-          </a:effectRef>
-          <a:fontRef idx="minor">
-            <a:schemeClr val="dk1"/>
-          </a:fontRef>
-        </p:style>
-        <p:txBody>
-          <a:bodyPr rtlCol="0" anchor="ctr"/>
-          <a:lstStyle/>
-          <a:p>
-            <a:pPr algn="ctr"/>
-            <a:r>
-              <a:rPr lang="ko-KR" altLang="en-US" sz="1200" dirty="0" smtClean="0"/>
-              <a:t>로그</a:t>
-            </a:r>
-            <a:r>
-              <a:rPr lang="ko-KR" altLang="en-US" sz="1200" dirty="0"/>
-              <a:t>인</a:t>
-            </a:r>
-          </a:p>
-        </p:txBody>
-      </p:sp>
-      <p:sp>
-        <p:nvSpPr>
-          <p:cNvPr id="58" name="타원 57"/>
-          <p:cNvSpPr/>
-          <p:nvPr/>
-        </p:nvSpPr>
-        <p:spPr>
-          <a:xfrm>
-            <a:off x="2771800" y="2492896"/>
-            <a:ext cx="1440160" cy="648072"/>
-          </a:xfrm>
-          <a:prstGeom prst="ellipse">
-            <a:avLst/>
-          </a:prstGeom>
-        </p:spPr>
-        <p:style>
-          <a:lnRef idx="2">
-            <a:schemeClr val="dk1"/>
-          </a:lnRef>
-          <a:fillRef idx="1">
-            <a:schemeClr val="lt1"/>
-          </a:fillRef>
-          <a:effectRef idx="0">
-            <a:schemeClr val="dk1"/>
-          </a:effectRef>
-          <a:fontRef idx="minor">
-            <a:schemeClr val="dk1"/>
-          </a:fontRef>
-        </p:style>
-        <p:txBody>
-          <a:bodyPr rtlCol="0" anchor="ctr"/>
-          <a:lstStyle/>
-          <a:p>
-            <a:pPr algn="ctr"/>
-            <a:r>
-              <a:rPr lang="ko-KR" altLang="en-US" sz="1200" dirty="0" smtClean="0"/>
-              <a:t>로그아웃</a:t>
-            </a:r>
-            <a:endParaRPr lang="ko-KR" altLang="en-US" sz="1200" dirty="0"/>
-          </a:p>
-        </p:txBody>
-      </p:sp>
       <p:grpSp>
         <p:nvGrpSpPr>
           <p:cNvPr id="59" name="그룹 58"/>
@@ -4399,44 +4323,14 @@
       </p:grpSp>
       <p:sp>
         <p:nvSpPr>
-          <p:cNvPr id="65" name="TextBox 64"/>
-          <p:cNvSpPr txBox="1"/>
-          <p:nvPr/>
-        </p:nvSpPr>
-        <p:spPr>
-          <a:xfrm>
-            <a:off x="5004048" y="2276872"/>
-            <a:ext cx="2088232" cy="276999"/>
-          </a:xfrm>
-          <a:prstGeom prst="rect">
-            <a:avLst/>
-          </a:prstGeom>
-          <a:noFill/>
-        </p:spPr>
-        <p:txBody>
-          <a:bodyPr wrap="square" rtlCol="0">
-            <a:spAutoFit/>
-          </a:bodyPr>
-          <a:lstStyle/>
-          <a:p>
-            <a:r>
-              <a:rPr lang="ko-KR" altLang="en-US" sz="1200" dirty="0" smtClean="0"/>
-              <a:t>프로그램 종료</a:t>
-            </a:r>
-            <a:endParaRPr lang="ko-KR" altLang="en-US" sz="1200" dirty="0"/>
-          </a:p>
-        </p:txBody>
-      </p:sp>
-      <p:sp>
-        <p:nvSpPr>
           <p:cNvPr id="66" name="타원 65"/>
           <p:cNvSpPr/>
           <p:nvPr/>
         </p:nvSpPr>
         <p:spPr>
           <a:xfrm>
-            <a:off x="2771800" y="3284984"/>
-            <a:ext cx="2304256" cy="648072"/>
+            <a:off x="2915816" y="2924944"/>
+            <a:ext cx="1944216" cy="504056"/>
           </a:xfrm>
           <a:prstGeom prst="ellipse">
             <a:avLst/>
@@ -4463,7 +4357,7 @@
             <a:pPr algn="ctr"/>
             <a:r>
               <a:rPr lang="ko-KR" altLang="en-US" sz="1200" dirty="0" smtClean="0"/>
-              <a:t>판매 완료 상품 조회</a:t>
+              <a:t>판매 중인 상품 조회</a:t>
             </a:r>
             <a:endParaRPr lang="ko-KR" altLang="en-US" sz="1200" dirty="0"/>
           </a:p>
@@ -5047,109 +4941,355 @@
           </a:p>
         </p:txBody>
       </p:sp>
-      <p:cxnSp>
-        <p:nvCxnSpPr>
-          <p:cNvPr id="85" name="직선 화살표 연결선 84"/>
-          <p:cNvCxnSpPr>
-            <a:endCxn id="55" idx="2"/>
-          </p:cNvCxnSpPr>
-          <p:nvPr/>
-        </p:nvCxnSpPr>
-        <p:spPr>
-          <a:xfrm flipV="1">
-            <a:off x="1619672" y="656692"/>
-            <a:ext cx="1152128" cy="324036"/>
-          </a:xfrm>
-          <a:prstGeom prst="straightConnector1">
+      <p:grpSp>
+        <p:nvGrpSpPr>
+          <p:cNvPr id="51" name="그룹 50"/>
+          <p:cNvGrpSpPr/>
+          <p:nvPr/>
+        </p:nvGrpSpPr>
+        <p:grpSpPr>
+          <a:xfrm>
+            <a:off x="1403648" y="188640"/>
+            <a:ext cx="2448272" cy="720080"/>
+            <a:chOff x="1619672" y="332656"/>
+            <a:chExt cx="2592288" cy="925817"/>
+          </a:xfrm>
+        </p:grpSpPr>
+        <p:sp>
+          <p:nvSpPr>
+            <p:cNvPr id="55" name="타원 54"/>
+            <p:cNvSpPr/>
+            <p:nvPr/>
+          </p:nvSpPr>
+          <p:spPr>
+            <a:xfrm>
+              <a:off x="2771800" y="332656"/>
+              <a:ext cx="1440160" cy="648072"/>
+            </a:xfrm>
+            <a:prstGeom prst="ellipse">
+              <a:avLst/>
+            </a:prstGeom>
+          </p:spPr>
+          <p:style>
+            <a:lnRef idx="2">
+              <a:schemeClr val="dk1"/>
+            </a:lnRef>
+            <a:fillRef idx="1">
+              <a:schemeClr val="lt1"/>
+            </a:fillRef>
+            <a:effectRef idx="0">
+              <a:schemeClr val="dk1"/>
+            </a:effectRef>
+            <a:fontRef idx="minor">
+              <a:schemeClr val="dk1"/>
+            </a:fontRef>
+          </p:style>
+          <p:txBody>
+            <a:bodyPr rtlCol="0" anchor="ctr"/>
+            <a:lstStyle/>
+            <a:p>
+              <a:pPr algn="ctr"/>
+              <a:r>
+                <a:rPr lang="ko-KR" altLang="en-US" sz="1200" dirty="0" smtClean="0"/>
+                <a:t>회원 가입</a:t>
+              </a:r>
+              <a:endParaRPr lang="ko-KR" altLang="en-US" sz="1200" dirty="0"/>
+            </a:p>
+          </p:txBody>
+        </p:sp>
+        <p:cxnSp>
+          <p:nvCxnSpPr>
+            <p:cNvPr id="85" name="직선 화살표 연결선 84"/>
+            <p:cNvCxnSpPr>
+              <a:endCxn id="55" idx="2"/>
+            </p:cNvCxnSpPr>
+            <p:nvPr/>
+          </p:nvCxnSpPr>
+          <p:spPr>
+            <a:xfrm flipV="1">
+              <a:off x="1619672" y="656692"/>
+              <a:ext cx="1152128" cy="601781"/>
+            </a:xfrm>
+            <a:prstGeom prst="straightConnector1">
+              <a:avLst/>
+            </a:prstGeom>
+            <a:ln w="28575">
+              <a:tailEnd type="arrow"/>
+            </a:ln>
+          </p:spPr>
+          <p:style>
+            <a:lnRef idx="1">
+              <a:schemeClr val="dk1"/>
+            </a:lnRef>
+            <a:fillRef idx="0">
+              <a:schemeClr val="dk1"/>
+            </a:fillRef>
+            <a:effectRef idx="0">
+              <a:schemeClr val="dk1"/>
+            </a:effectRef>
+            <a:fontRef idx="minor">
+              <a:schemeClr val="tx1"/>
+            </a:fontRef>
+          </p:style>
+        </p:cxnSp>
+      </p:grpSp>
+      <p:grpSp>
+        <p:nvGrpSpPr>
+          <p:cNvPr id="86" name="그룹 85"/>
+          <p:cNvGrpSpPr/>
+          <p:nvPr/>
+        </p:nvGrpSpPr>
+        <p:grpSpPr>
+          <a:xfrm>
+            <a:off x="1403648" y="1556792"/>
+            <a:ext cx="2736304" cy="432048"/>
+            <a:chOff x="1475656" y="1772816"/>
+            <a:chExt cx="2736304" cy="648072"/>
+          </a:xfrm>
+        </p:grpSpPr>
+        <p:sp>
+          <p:nvSpPr>
+            <p:cNvPr id="57" name="타원 56"/>
+            <p:cNvSpPr/>
+            <p:nvPr/>
+          </p:nvSpPr>
+          <p:spPr>
+            <a:xfrm>
+              <a:off x="2771800" y="1772816"/>
+              <a:ext cx="1440160" cy="648072"/>
+            </a:xfrm>
+            <a:prstGeom prst="ellipse">
+              <a:avLst/>
+            </a:prstGeom>
+          </p:spPr>
+          <p:style>
+            <a:lnRef idx="2">
+              <a:schemeClr val="dk1"/>
+            </a:lnRef>
+            <a:fillRef idx="1">
+              <a:schemeClr val="lt1"/>
+            </a:fillRef>
+            <a:effectRef idx="0">
+              <a:schemeClr val="dk1"/>
+            </a:effectRef>
+            <a:fontRef idx="minor">
+              <a:schemeClr val="dk1"/>
+            </a:fontRef>
+          </p:style>
+          <p:txBody>
+            <a:bodyPr rtlCol="0" anchor="ctr"/>
+            <a:lstStyle/>
+            <a:p>
+              <a:pPr algn="ctr"/>
+              <a:r>
+                <a:rPr lang="ko-KR" altLang="en-US" sz="1200" dirty="0" smtClean="0"/>
+                <a:t>로그</a:t>
+              </a:r>
+              <a:r>
+                <a:rPr lang="ko-KR" altLang="en-US" sz="1200" dirty="0"/>
+                <a:t>인</a:t>
+              </a:r>
+            </a:p>
+          </p:txBody>
+        </p:sp>
+        <p:cxnSp>
+          <p:nvCxnSpPr>
+            <p:cNvPr id="87" name="직선 화살표 연결선 86"/>
+            <p:cNvCxnSpPr>
+              <a:stCxn id="54" idx="3"/>
+            </p:cNvCxnSpPr>
+            <p:nvPr/>
+          </p:nvCxnSpPr>
+          <p:spPr>
+            <a:xfrm>
+              <a:off x="1475656" y="1839308"/>
+              <a:ext cx="1296144" cy="257544"/>
+            </a:xfrm>
+            <a:prstGeom prst="straightConnector1">
+              <a:avLst/>
+            </a:prstGeom>
+            <a:ln w="28575">
+              <a:tailEnd type="arrow"/>
+            </a:ln>
+          </p:spPr>
+          <p:style>
+            <a:lnRef idx="1">
+              <a:schemeClr val="dk1"/>
+            </a:lnRef>
+            <a:fillRef idx="0">
+              <a:schemeClr val="dk1"/>
+            </a:fillRef>
+            <a:effectRef idx="0">
+              <a:schemeClr val="dk1"/>
+            </a:effectRef>
+            <a:fontRef idx="minor">
+              <a:schemeClr val="tx1"/>
+            </a:fontRef>
+          </p:style>
+        </p:cxnSp>
+      </p:grpSp>
+      <p:grpSp>
+        <p:nvGrpSpPr>
+          <p:cNvPr id="53" name="그룹 52"/>
+          <p:cNvGrpSpPr/>
+          <p:nvPr/>
+        </p:nvGrpSpPr>
+        <p:grpSpPr>
+          <a:xfrm>
+            <a:off x="1331640" y="764704"/>
+            <a:ext cx="2808312" cy="576064"/>
+            <a:chOff x="1403648" y="1052736"/>
+            <a:chExt cx="2808312" cy="648072"/>
+          </a:xfrm>
+        </p:grpSpPr>
+        <p:sp>
+          <p:nvSpPr>
+            <p:cNvPr id="56" name="타원 55"/>
+            <p:cNvSpPr/>
+            <p:nvPr/>
+          </p:nvSpPr>
+          <p:spPr>
+            <a:xfrm>
+              <a:off x="2771800" y="1052736"/>
+              <a:ext cx="1440160" cy="648072"/>
+            </a:xfrm>
+            <a:prstGeom prst="ellipse">
+              <a:avLst/>
+            </a:prstGeom>
+          </p:spPr>
+          <p:style>
+            <a:lnRef idx="2">
+              <a:schemeClr val="dk1"/>
+            </a:lnRef>
+            <a:fillRef idx="1">
+              <a:schemeClr val="lt1"/>
+            </a:fillRef>
+            <a:effectRef idx="0">
+              <a:schemeClr val="dk1"/>
+            </a:effectRef>
+            <a:fontRef idx="minor">
+              <a:schemeClr val="dk1"/>
+            </a:fontRef>
+          </p:style>
+          <p:txBody>
+            <a:bodyPr rtlCol="0" anchor="ctr"/>
+            <a:lstStyle/>
+            <a:p>
+              <a:pPr algn="ctr"/>
+              <a:r>
+                <a:rPr lang="ko-KR" altLang="en-US" sz="1200" dirty="0" smtClean="0"/>
+                <a:t>회원 탈퇴</a:t>
+              </a:r>
+              <a:endParaRPr lang="ko-KR" altLang="en-US" sz="1200" dirty="0"/>
+            </a:p>
+          </p:txBody>
+        </p:sp>
+        <p:cxnSp>
+          <p:nvCxnSpPr>
+            <p:cNvPr id="88" name="직선 화살표 연결선 87"/>
+            <p:cNvCxnSpPr/>
+            <p:nvPr/>
+          </p:nvCxnSpPr>
+          <p:spPr>
+            <a:xfrm flipV="1">
+              <a:off x="1403648" y="1376772"/>
+              <a:ext cx="1368152" cy="162018"/>
+            </a:xfrm>
+            <a:prstGeom prst="straightConnector1">
+              <a:avLst/>
+            </a:prstGeom>
+            <a:ln w="28575">
+              <a:tailEnd type="arrow"/>
+            </a:ln>
+          </p:spPr>
+          <p:style>
+            <a:lnRef idx="1">
+              <a:schemeClr val="dk1"/>
+            </a:lnRef>
+            <a:fillRef idx="0">
+              <a:schemeClr val="dk1"/>
+            </a:fillRef>
+            <a:effectRef idx="0">
+              <a:schemeClr val="dk1"/>
+            </a:effectRef>
+            <a:fontRef idx="minor">
+              <a:schemeClr val="tx1"/>
+            </a:fontRef>
+          </p:style>
+        </p:cxnSp>
+      </p:grpSp>
+      <p:sp>
+        <p:nvSpPr>
+          <p:cNvPr id="58" name="타원 57"/>
+          <p:cNvSpPr/>
+          <p:nvPr/>
+        </p:nvSpPr>
+        <p:spPr>
+          <a:xfrm>
+            <a:off x="2771800" y="2335379"/>
+            <a:ext cx="1440160" cy="445550"/>
+          </a:xfrm>
+          <a:prstGeom prst="ellipse">
             <a:avLst/>
           </a:prstGeom>
-          <a:ln w="28575">
-            <a:tailEnd type="arrow"/>
-          </a:ln>
         </p:spPr>
         <p:style>
-          <a:lnRef idx="1">
+          <a:lnRef idx="2">
             <a:schemeClr val="dk1"/>
           </a:lnRef>
-          <a:fillRef idx="0">
-            <a:schemeClr val="dk1"/>
+          <a:fillRef idx="1">
+            <a:schemeClr val="lt1"/>
           </a:fillRef>
           <a:effectRef idx="0">
             <a:schemeClr val="dk1"/>
           </a:effectRef>
           <a:fontRef idx="minor">
-            <a:schemeClr val="tx1"/>
+            <a:schemeClr val="dk1"/>
           </a:fontRef>
         </p:style>
-      </p:cxnSp>
-      <p:cxnSp>
-        <p:nvCxnSpPr>
-          <p:cNvPr id="87" name="직선 화살표 연결선 86"/>
-          <p:cNvCxnSpPr>
-            <a:stCxn id="54" idx="3"/>
-          </p:cNvCxnSpPr>
-          <p:nvPr/>
-        </p:nvCxnSpPr>
-        <p:spPr>
-          <a:xfrm>
-            <a:off x="1475656" y="1839308"/>
-            <a:ext cx="1296144" cy="257544"/>
-          </a:xfrm>
-          <a:prstGeom prst="straightConnector1">
+        <p:txBody>
+          <a:bodyPr rtlCol="0" anchor="ctr"/>
+          <a:lstStyle/>
+          <a:p>
+            <a:pPr algn="ctr"/>
+            <a:r>
+              <a:rPr lang="ko-KR" altLang="en-US" sz="1200" dirty="0" smtClean="0"/>
+              <a:t>로그아웃</a:t>
+            </a:r>
+            <a:endParaRPr lang="ko-KR" altLang="en-US" sz="1200" dirty="0"/>
+          </a:p>
+        </p:txBody>
+      </p:sp>
+      <p:sp>
+        <p:nvSpPr>
+          <p:cNvPr id="65" name="TextBox 64"/>
+          <p:cNvSpPr txBox="1"/>
+          <p:nvPr/>
+        </p:nvSpPr>
+        <p:spPr>
+          <a:xfrm>
+            <a:off x="5004048" y="2186862"/>
+            <a:ext cx="2088232" cy="190437"/>
+          </a:xfrm>
+          <a:prstGeom prst="rect">
             <a:avLst/>
           </a:prstGeom>
-          <a:ln w="28575">
-            <a:tailEnd type="arrow"/>
-          </a:ln>
-        </p:spPr>
-        <p:style>
-          <a:lnRef idx="1">
-            <a:schemeClr val="dk1"/>
-          </a:lnRef>
-          <a:fillRef idx="0">
-            <a:schemeClr val="dk1"/>
-          </a:fillRef>
-          <a:effectRef idx="0">
-            <a:schemeClr val="dk1"/>
-          </a:effectRef>
-          <a:fontRef idx="minor">
-            <a:schemeClr val="tx1"/>
-          </a:fontRef>
-        </p:style>
-      </p:cxnSp>
-      <p:cxnSp>
-        <p:nvCxnSpPr>
-          <p:cNvPr id="88" name="직선 화살표 연결선 87"/>
-          <p:cNvCxnSpPr/>
-          <p:nvPr/>
-        </p:nvCxnSpPr>
-        <p:spPr>
-          <a:xfrm flipV="1">
-            <a:off x="1547664" y="1376772"/>
-            <a:ext cx="1224136" cy="36004"/>
-          </a:xfrm>
-          <a:prstGeom prst="straightConnector1">
-            <a:avLst/>
-          </a:prstGeom>
-          <a:ln w="28575">
-            <a:tailEnd type="arrow"/>
-          </a:ln>
-        </p:spPr>
-        <p:style>
-          <a:lnRef idx="1">
-            <a:schemeClr val="dk1"/>
-          </a:lnRef>
-          <a:fillRef idx="0">
-            <a:schemeClr val="dk1"/>
-          </a:fillRef>
-          <a:effectRef idx="0">
-            <a:schemeClr val="dk1"/>
-          </a:effectRef>
-          <a:fontRef idx="minor">
-            <a:schemeClr val="tx1"/>
-          </a:fontRef>
-        </p:style>
-      </p:cxnSp>
+          <a:noFill/>
+        </p:spPr>
+        <p:txBody>
+          <a:bodyPr wrap="square" rtlCol="0">
+            <a:spAutoFit/>
+          </a:bodyPr>
+          <a:lstStyle/>
+          <a:p>
+            <a:r>
+              <a:rPr lang="ko-KR" altLang="en-US" sz="1200" dirty="0" smtClean="0"/>
+              <a:t>프로그램 종료</a:t>
+            </a:r>
+            <a:endParaRPr lang="ko-KR" altLang="en-US" sz="1200" dirty="0"/>
+          </a:p>
+        </p:txBody>
+      </p:sp>
       <p:cxnSp>
         <p:nvCxnSpPr>
           <p:cNvPr id="91" name="직선 화살표 연결선 90"/>
@@ -5161,7 +5301,7 @@
         <p:spPr>
           <a:xfrm flipV="1">
             <a:off x="4211960" y="1988840"/>
-            <a:ext cx="936104" cy="828092"/>
+            <a:ext cx="936104" cy="569313"/>
           </a:xfrm>
           <a:prstGeom prst="straightConnector1">
             <a:avLst/>
@@ -5193,8 +5333,8 @@
         </p:nvCxnSpPr>
         <p:spPr>
           <a:xfrm>
-            <a:off x="1403648" y="2060848"/>
-            <a:ext cx="1368152" cy="761600"/>
+            <a:off x="1403648" y="2038346"/>
+            <a:ext cx="1368152" cy="523600"/>
           </a:xfrm>
           <a:prstGeom prst="straightConnector1">
             <a:avLst/>
@@ -5483,6 +5623,481 @@
               <a:rPr lang="en-US" altLang="ko-KR" sz="1200" dirty="0"/>
               <a:t>‹‹extend››</a:t>
             </a:r>
+          </a:p>
+        </p:txBody>
+      </p:sp>
+      <p:sp>
+        <p:nvSpPr>
+          <p:cNvPr id="92" name="타원 91"/>
+          <p:cNvSpPr/>
+          <p:nvPr/>
+        </p:nvSpPr>
+        <p:spPr>
+          <a:xfrm>
+            <a:off x="2771800" y="3573016"/>
+            <a:ext cx="1944216" cy="504056"/>
+          </a:xfrm>
+          <a:prstGeom prst="ellipse">
+            <a:avLst/>
+          </a:prstGeom>
+        </p:spPr>
+        <p:style>
+          <a:lnRef idx="2">
+            <a:schemeClr val="dk1"/>
+          </a:lnRef>
+          <a:fillRef idx="1">
+            <a:schemeClr val="lt1"/>
+          </a:fillRef>
+          <a:effectRef idx="0">
+            <a:schemeClr val="dk1"/>
+          </a:effectRef>
+          <a:fontRef idx="minor">
+            <a:schemeClr val="dk1"/>
+          </a:fontRef>
+        </p:style>
+        <p:txBody>
+          <a:bodyPr rtlCol="0" anchor="ctr"/>
+          <a:lstStyle/>
+          <a:p>
+            <a:pPr algn="ctr"/>
+            <a:r>
+              <a:rPr lang="ko-KR" altLang="en-US" sz="1200" dirty="0" smtClean="0"/>
+              <a:t>판매 완료 상품 조회</a:t>
+            </a:r>
+            <a:endParaRPr lang="ko-KR" altLang="en-US" sz="1200" dirty="0"/>
+          </a:p>
+        </p:txBody>
+      </p:sp>
+      <p:cxnSp>
+        <p:nvCxnSpPr>
+          <p:cNvPr id="94" name="직선 화살표 연결선 93"/>
+          <p:cNvCxnSpPr/>
+          <p:nvPr/>
+        </p:nvCxnSpPr>
+        <p:spPr>
+          <a:xfrm>
+            <a:off x="1331640" y="2060848"/>
+            <a:ext cx="1584176" cy="1080120"/>
+          </a:xfrm>
+          <a:prstGeom prst="straightConnector1">
+            <a:avLst/>
+          </a:prstGeom>
+          <a:ln w="28575">
+            <a:tailEnd type="arrow"/>
+          </a:ln>
+        </p:spPr>
+        <p:style>
+          <a:lnRef idx="1">
+            <a:schemeClr val="dk1"/>
+          </a:lnRef>
+          <a:fillRef idx="0">
+            <a:schemeClr val="dk1"/>
+          </a:fillRef>
+          <a:effectRef idx="0">
+            <a:schemeClr val="dk1"/>
+          </a:effectRef>
+          <a:fontRef idx="minor">
+            <a:schemeClr val="tx1"/>
+          </a:fontRef>
+        </p:style>
+      </p:cxnSp>
+      <p:cxnSp>
+        <p:nvCxnSpPr>
+          <p:cNvPr id="98" name="직선 화살표 연결선 97"/>
+          <p:cNvCxnSpPr/>
+          <p:nvPr/>
+        </p:nvCxnSpPr>
+        <p:spPr>
+          <a:xfrm flipH="1">
+            <a:off x="4788024" y="3356992"/>
+            <a:ext cx="1008112" cy="1152128"/>
+          </a:xfrm>
+          <a:prstGeom prst="straightConnector1">
+            <a:avLst/>
+          </a:prstGeom>
+          <a:ln w="28575">
+            <a:prstDash val="dash"/>
+            <a:tailEnd type="arrow"/>
+          </a:ln>
+        </p:spPr>
+        <p:style>
+          <a:lnRef idx="1">
+            <a:schemeClr val="dk1"/>
+          </a:lnRef>
+          <a:fillRef idx="0">
+            <a:schemeClr val="dk1"/>
+          </a:fillRef>
+          <a:effectRef idx="0">
+            <a:schemeClr val="dk1"/>
+          </a:effectRef>
+          <a:fontRef idx="minor">
+            <a:schemeClr val="tx1"/>
+          </a:fontRef>
+        </p:style>
+      </p:cxnSp>
+      <p:sp>
+        <p:nvSpPr>
+          <p:cNvPr id="102" name="TextBox 101"/>
+          <p:cNvSpPr txBox="1"/>
+          <p:nvPr/>
+        </p:nvSpPr>
+        <p:spPr>
+          <a:xfrm rot="18911271">
+            <a:off x="4667161" y="3701091"/>
+            <a:ext cx="1008112" cy="276999"/>
+          </a:xfrm>
+          <a:prstGeom prst="rect">
+            <a:avLst/>
+          </a:prstGeom>
+          <a:noFill/>
+        </p:spPr>
+        <p:txBody>
+          <a:bodyPr wrap="square" rtlCol="0">
+            <a:spAutoFit/>
+          </a:bodyPr>
+          <a:lstStyle/>
+          <a:p>
+            <a:r>
+              <a:rPr lang="en-US" altLang="ko-KR" sz="1200" dirty="0"/>
+              <a:t>‹‹extend››</a:t>
+            </a:r>
+          </a:p>
+        </p:txBody>
+      </p:sp>
+      <p:sp>
+        <p:nvSpPr>
+          <p:cNvPr id="103" name="타원 102"/>
+          <p:cNvSpPr/>
+          <p:nvPr/>
+        </p:nvSpPr>
+        <p:spPr>
+          <a:xfrm>
+            <a:off x="5796136" y="2924944"/>
+            <a:ext cx="1440160" cy="648072"/>
+          </a:xfrm>
+          <a:prstGeom prst="ellipse">
+            <a:avLst/>
+          </a:prstGeom>
+        </p:spPr>
+        <p:style>
+          <a:lnRef idx="2">
+            <a:schemeClr val="dk1"/>
+          </a:lnRef>
+          <a:fillRef idx="1">
+            <a:schemeClr val="lt1"/>
+          </a:fillRef>
+          <a:effectRef idx="0">
+            <a:schemeClr val="dk1"/>
+          </a:effectRef>
+          <a:fontRef idx="minor">
+            <a:schemeClr val="dk1"/>
+          </a:fontRef>
+        </p:style>
+        <p:txBody>
+          <a:bodyPr rtlCol="0" anchor="ctr"/>
+          <a:lstStyle/>
+          <a:p>
+            <a:pPr algn="ctr"/>
+            <a:r>
+              <a:rPr lang="ko-KR" altLang="en-US" sz="1200" dirty="0" smtClean="0"/>
+              <a:t>상품 </a:t>
+            </a:r>
+            <a:endParaRPr lang="en-US" altLang="ko-KR" sz="1200" dirty="0" smtClean="0"/>
+          </a:p>
+          <a:p>
+            <a:pPr algn="ctr"/>
+            <a:r>
+              <a:rPr lang="ko-KR" altLang="en-US" sz="1200" dirty="0" smtClean="0"/>
+              <a:t>구매만족도 평가</a:t>
+            </a:r>
+            <a:endParaRPr lang="ko-KR" altLang="en-US" sz="1200" dirty="0"/>
+          </a:p>
+        </p:txBody>
+      </p:sp>
+      <p:grpSp>
+        <p:nvGrpSpPr>
+          <p:cNvPr id="104" name="그룹 103"/>
+          <p:cNvGrpSpPr/>
+          <p:nvPr/>
+        </p:nvGrpSpPr>
+        <p:grpSpPr>
+          <a:xfrm>
+            <a:off x="7164288" y="1628800"/>
+            <a:ext cx="360040" cy="576064"/>
+            <a:chOff x="323528" y="620688"/>
+            <a:chExt cx="864096" cy="1656184"/>
+          </a:xfrm>
+        </p:grpSpPr>
+        <p:sp>
+          <p:nvSpPr>
+            <p:cNvPr id="105" name="타원 104"/>
+            <p:cNvSpPr/>
+            <p:nvPr/>
+          </p:nvSpPr>
+          <p:spPr>
+            <a:xfrm>
+              <a:off x="539552" y="620688"/>
+              <a:ext cx="432048" cy="432048"/>
+            </a:xfrm>
+            <a:prstGeom prst="ellipse">
+              <a:avLst/>
+            </a:prstGeom>
+          </p:spPr>
+          <p:style>
+            <a:lnRef idx="2">
+              <a:schemeClr val="dk1"/>
+            </a:lnRef>
+            <a:fillRef idx="1">
+              <a:schemeClr val="lt1"/>
+            </a:fillRef>
+            <a:effectRef idx="0">
+              <a:schemeClr val="dk1"/>
+            </a:effectRef>
+            <a:fontRef idx="minor">
+              <a:schemeClr val="dk1"/>
+            </a:fontRef>
+          </p:style>
+          <p:txBody>
+            <a:bodyPr rtlCol="0" anchor="ctr"/>
+            <a:lstStyle/>
+            <a:p>
+              <a:pPr algn="ctr"/>
+              <a:endParaRPr lang="ko-KR" altLang="en-US"/>
+            </a:p>
+          </p:txBody>
+        </p:sp>
+        <p:cxnSp>
+          <p:nvCxnSpPr>
+            <p:cNvPr id="107" name="직선 연결선 106"/>
+            <p:cNvCxnSpPr/>
+            <p:nvPr/>
+          </p:nvCxnSpPr>
+          <p:spPr>
+            <a:xfrm>
+              <a:off x="323528" y="1196752"/>
+              <a:ext cx="864096" cy="0"/>
+            </a:xfrm>
+            <a:prstGeom prst="line">
+              <a:avLst/>
+            </a:prstGeom>
+            <a:ln w="38100"/>
+          </p:spPr>
+          <p:style>
+            <a:lnRef idx="1">
+              <a:schemeClr val="dk1"/>
+            </a:lnRef>
+            <a:fillRef idx="0">
+              <a:schemeClr val="dk1"/>
+            </a:fillRef>
+            <a:effectRef idx="0">
+              <a:schemeClr val="dk1"/>
+            </a:effectRef>
+            <a:fontRef idx="minor">
+              <a:schemeClr val="tx1"/>
+            </a:fontRef>
+          </p:style>
+        </p:cxnSp>
+        <p:cxnSp>
+          <p:nvCxnSpPr>
+            <p:cNvPr id="108" name="직선 연결선 107"/>
+            <p:cNvCxnSpPr/>
+            <p:nvPr/>
+          </p:nvCxnSpPr>
+          <p:spPr>
+            <a:xfrm flipH="1">
+              <a:off x="755576" y="1052736"/>
+              <a:ext cx="8384" cy="648072"/>
+            </a:xfrm>
+            <a:prstGeom prst="line">
+              <a:avLst/>
+            </a:prstGeom>
+            <a:ln w="38100"/>
+          </p:spPr>
+          <p:style>
+            <a:lnRef idx="1">
+              <a:schemeClr val="dk1"/>
+            </a:lnRef>
+            <a:fillRef idx="0">
+              <a:schemeClr val="dk1"/>
+            </a:fillRef>
+            <a:effectRef idx="0">
+              <a:schemeClr val="dk1"/>
+            </a:effectRef>
+            <a:fontRef idx="minor">
+              <a:schemeClr val="tx1"/>
+            </a:fontRef>
+          </p:style>
+        </p:cxnSp>
+        <p:cxnSp>
+          <p:nvCxnSpPr>
+            <p:cNvPr id="110" name="직선 연결선 109"/>
+            <p:cNvCxnSpPr/>
+            <p:nvPr/>
+          </p:nvCxnSpPr>
+          <p:spPr>
+            <a:xfrm flipH="1">
+              <a:off x="467544" y="1700808"/>
+              <a:ext cx="296416" cy="576064"/>
+            </a:xfrm>
+            <a:prstGeom prst="line">
+              <a:avLst/>
+            </a:prstGeom>
+            <a:ln w="38100"/>
+          </p:spPr>
+          <p:style>
+            <a:lnRef idx="1">
+              <a:schemeClr val="dk1"/>
+            </a:lnRef>
+            <a:fillRef idx="0">
+              <a:schemeClr val="dk1"/>
+            </a:fillRef>
+            <a:effectRef idx="0">
+              <a:schemeClr val="dk1"/>
+            </a:effectRef>
+            <a:fontRef idx="minor">
+              <a:schemeClr val="tx1"/>
+            </a:fontRef>
+          </p:style>
+        </p:cxnSp>
+        <p:cxnSp>
+          <p:nvCxnSpPr>
+            <p:cNvPr id="111" name="직선 연결선 110"/>
+            <p:cNvCxnSpPr/>
+            <p:nvPr/>
+          </p:nvCxnSpPr>
+          <p:spPr>
+            <a:xfrm>
+              <a:off x="755576" y="1709192"/>
+              <a:ext cx="360040" cy="567680"/>
+            </a:xfrm>
+            <a:prstGeom prst="line">
+              <a:avLst/>
+            </a:prstGeom>
+            <a:ln w="38100"/>
+          </p:spPr>
+          <p:style>
+            <a:lnRef idx="1">
+              <a:schemeClr val="dk1"/>
+            </a:lnRef>
+            <a:fillRef idx="0">
+              <a:schemeClr val="dk1"/>
+            </a:fillRef>
+            <a:effectRef idx="0">
+              <a:schemeClr val="dk1"/>
+            </a:effectRef>
+            <a:fontRef idx="minor">
+              <a:schemeClr val="tx1"/>
+            </a:fontRef>
+          </p:style>
+        </p:cxnSp>
+      </p:grpSp>
+      <p:cxnSp>
+        <p:nvCxnSpPr>
+          <p:cNvPr id="113" name="직선 화살표 연결선 112"/>
+          <p:cNvCxnSpPr/>
+          <p:nvPr/>
+        </p:nvCxnSpPr>
+        <p:spPr>
+          <a:xfrm flipV="1">
+            <a:off x="4860032" y="1988840"/>
+            <a:ext cx="2160240" cy="1145378"/>
+          </a:xfrm>
+          <a:prstGeom prst="straightConnector1">
+            <a:avLst/>
+          </a:prstGeom>
+          <a:ln w="28575">
+            <a:tailEnd type="arrow"/>
+          </a:ln>
+        </p:spPr>
+        <p:style>
+          <a:lnRef idx="1">
+            <a:schemeClr val="dk1"/>
+          </a:lnRef>
+          <a:fillRef idx="0">
+            <a:schemeClr val="dk1"/>
+          </a:fillRef>
+          <a:effectRef idx="0">
+            <a:schemeClr val="dk1"/>
+          </a:effectRef>
+          <a:fontRef idx="minor">
+            <a:schemeClr val="tx1"/>
+          </a:fontRef>
+        </p:style>
+      </p:cxnSp>
+      <p:cxnSp>
+        <p:nvCxnSpPr>
+          <p:cNvPr id="114" name="직선 화살표 연결선 113"/>
+          <p:cNvCxnSpPr/>
+          <p:nvPr/>
+        </p:nvCxnSpPr>
+        <p:spPr>
+          <a:xfrm flipV="1">
+            <a:off x="4716016" y="2060848"/>
+            <a:ext cx="2376264" cy="1649434"/>
+          </a:xfrm>
+          <a:prstGeom prst="straightConnector1">
+            <a:avLst/>
+          </a:prstGeom>
+          <a:ln w="28575">
+            <a:tailEnd type="arrow"/>
+          </a:ln>
+        </p:spPr>
+        <p:style>
+          <a:lnRef idx="1">
+            <a:schemeClr val="dk1"/>
+          </a:lnRef>
+          <a:fillRef idx="0">
+            <a:schemeClr val="dk1"/>
+          </a:fillRef>
+          <a:effectRef idx="0">
+            <a:schemeClr val="dk1"/>
+          </a:effectRef>
+          <a:fontRef idx="minor">
+            <a:schemeClr val="tx1"/>
+          </a:fontRef>
+        </p:style>
+      </p:cxnSp>
+      <p:sp>
+        <p:nvSpPr>
+          <p:cNvPr id="119" name="TextBox 118"/>
+          <p:cNvSpPr txBox="1"/>
+          <p:nvPr/>
+        </p:nvSpPr>
+        <p:spPr>
+          <a:xfrm>
+            <a:off x="7055768" y="2420888"/>
+            <a:ext cx="2088232" cy="461665"/>
+          </a:xfrm>
+          <a:prstGeom prst="rect">
+            <a:avLst/>
+          </a:prstGeom>
+          <a:noFill/>
+        </p:spPr>
+        <p:txBody>
+          <a:bodyPr wrap="square" rtlCol="0">
+            <a:spAutoFit/>
+          </a:bodyPr>
+          <a:lstStyle/>
+          <a:p>
+            <a:r>
+              <a:rPr lang="ko-KR" altLang="en-US" sz="1200" dirty="0" smtClean="0"/>
+              <a:t>판매 상품 관리</a:t>
+            </a:r>
+            <a:r>
+              <a:rPr lang="en-US" altLang="ko-KR" sz="1200" dirty="0" smtClean="0"/>
+              <a:t> </a:t>
+            </a:r>
+          </a:p>
+          <a:p>
+            <a:r>
+              <a:rPr lang="ko-KR" altLang="en-US" sz="1200" dirty="0" smtClean="0"/>
+              <a:t>데이터베이</a:t>
+            </a:r>
+            <a:r>
+              <a:rPr lang="ko-KR" altLang="en-US" sz="1200" dirty="0" smtClean="0"/>
+              <a:t>스</a:t>
+            </a:r>
+            <a:endParaRPr lang="ko-KR" altLang="en-US" sz="1200" dirty="0"/>
           </a:p>
         </p:txBody>
       </p:sp>
@@ -5900,11 +6515,7 @@
             <a:p>
               <a:r>
                 <a:rPr lang="ko-KR" altLang="en-US" dirty="0" smtClean="0"/>
-                <a:t>쇼핑</a:t>
-              </a:r>
-              <a:r>
-                <a:rPr lang="ko-KR" altLang="en-US" dirty="0" smtClean="0"/>
-                <a:t>몰</a:t>
+                <a:t>쇼핑몰</a:t>
               </a:r>
               <a:endParaRPr lang="ko-KR" altLang="en-US" dirty="0"/>
             </a:p>
@@ -6849,7 +7460,7 @@
         </p:nvSpPr>
         <p:spPr>
           <a:xfrm>
-            <a:off x="5076056" y="908720"/>
+            <a:off x="6228184" y="908720"/>
             <a:ext cx="2664296" cy="4752528"/>
           </a:xfrm>
           <a:prstGeom prst="rect">
@@ -6887,7 +7498,7 @@
         </p:nvGrpSpPr>
         <p:grpSpPr>
           <a:xfrm>
-            <a:off x="1115616" y="908720"/>
+            <a:off x="3275856" y="908720"/>
             <a:ext cx="2664296" cy="4752528"/>
             <a:chOff x="1115616" y="908720"/>
             <a:chExt cx="2664296" cy="4752528"/>
@@ -7101,11 +7712,7 @@
               <a:pPr algn="ctr"/>
               <a:r>
                 <a:rPr lang="ko-KR" altLang="en-US" sz="1400" dirty="0" smtClean="0"/>
-                <a:t>사</a:t>
-              </a:r>
-              <a:r>
-                <a:rPr lang="ko-KR" altLang="en-US" sz="1400" dirty="0" smtClean="0"/>
-                <a:t>진</a:t>
+                <a:t>사진</a:t>
               </a:r>
               <a:endParaRPr lang="ko-KR" altLang="en-US" sz="1400" dirty="0"/>
             </a:p>
@@ -7294,11 +7901,7 @@
               <a:pPr algn="ctr"/>
               <a:r>
                 <a:rPr lang="ko-KR" altLang="en-US" sz="1400" dirty="0" smtClean="0"/>
-                <a:t>사</a:t>
-              </a:r>
-              <a:r>
-                <a:rPr lang="ko-KR" altLang="en-US" sz="1400" dirty="0" smtClean="0"/>
-                <a:t>진</a:t>
+                <a:t>사진</a:t>
               </a:r>
               <a:endParaRPr lang="ko-KR" altLang="en-US" sz="1400" dirty="0"/>
             </a:p>
@@ -7487,11 +8090,7 @@
               <a:pPr algn="ctr"/>
               <a:r>
                 <a:rPr lang="ko-KR" altLang="en-US" sz="1400" dirty="0" smtClean="0"/>
-                <a:t>사</a:t>
-              </a:r>
-              <a:r>
-                <a:rPr lang="ko-KR" altLang="en-US" sz="1400" dirty="0" smtClean="0"/>
-                <a:t>진</a:t>
+                <a:t>사진</a:t>
               </a:r>
               <a:endParaRPr lang="ko-KR" altLang="en-US" sz="1400" dirty="0"/>
             </a:p>
@@ -7675,7 +8274,7 @@
         </p:nvSpPr>
         <p:spPr>
           <a:xfrm>
-            <a:off x="5220072" y="1124744"/>
+            <a:off x="6372200" y="1124744"/>
             <a:ext cx="1512168" cy="369332"/>
           </a:xfrm>
           <a:prstGeom prst="rect">
@@ -7705,7 +8304,7 @@
         </p:nvSpPr>
         <p:spPr>
           <a:xfrm>
-            <a:off x="5220072" y="1495817"/>
+            <a:off x="6372200" y="1495817"/>
             <a:ext cx="1008112" cy="276999"/>
           </a:xfrm>
           <a:prstGeom prst="rect">
@@ -7735,7 +8334,7 @@
         </p:nvSpPr>
         <p:spPr>
           <a:xfrm>
-            <a:off x="5292080" y="1772816"/>
+            <a:off x="6444208" y="1772816"/>
             <a:ext cx="792088" cy="288032"/>
           </a:xfrm>
           <a:prstGeom prst="rect">
@@ -7777,7 +8376,7 @@
         </p:nvSpPr>
         <p:spPr>
           <a:xfrm>
-            <a:off x="6084168" y="1700808"/>
+            <a:off x="7236296" y="1700808"/>
             <a:ext cx="360040" cy="369332"/>
           </a:xfrm>
           <a:prstGeom prst="rect">
@@ -7807,7 +8406,7 @@
         </p:nvSpPr>
         <p:spPr>
           <a:xfrm>
-            <a:off x="6372200" y="1772816"/>
+            <a:off x="7524328" y="1772816"/>
             <a:ext cx="792088" cy="288032"/>
           </a:xfrm>
           <a:prstGeom prst="rect">
@@ -7849,7 +8448,7 @@
         </p:nvSpPr>
         <p:spPr>
           <a:xfrm>
-            <a:off x="7236296" y="1772816"/>
+            <a:off x="8388424" y="1772816"/>
             <a:ext cx="432048" cy="288032"/>
           </a:xfrm>
           <a:prstGeom prst="roundRect">
@@ -7891,7 +8490,7 @@
         </p:nvSpPr>
         <p:spPr>
           <a:xfrm>
-            <a:off x="5436096" y="2132856"/>
+            <a:off x="6588224" y="2132856"/>
             <a:ext cx="2304256" cy="261610"/>
           </a:xfrm>
           <a:prstGeom prst="rect">
@@ -7929,7 +8528,7 @@
         </p:nvCxnSpPr>
         <p:spPr>
           <a:xfrm>
-            <a:off x="5076056" y="2492896"/>
+            <a:off x="6228184" y="2492896"/>
             <a:ext cx="2664296" cy="0"/>
           </a:xfrm>
           <a:prstGeom prst="line">
@@ -7966,7 +8565,7 @@
         </p:nvCxnSpPr>
         <p:spPr>
           <a:xfrm>
-            <a:off x="5076056" y="2924944"/>
+            <a:off x="6228184" y="2924944"/>
             <a:ext cx="2664296" cy="0"/>
           </a:xfrm>
           <a:prstGeom prst="line">
@@ -8003,7 +8602,7 @@
         </p:nvCxnSpPr>
         <p:spPr>
           <a:xfrm>
-            <a:off x="5076056" y="3356992"/>
+            <a:off x="6228184" y="3356992"/>
             <a:ext cx="2664296" cy="0"/>
           </a:xfrm>
           <a:prstGeom prst="line">
@@ -8040,7 +8639,7 @@
         </p:nvCxnSpPr>
         <p:spPr>
           <a:xfrm>
-            <a:off x="5076056" y="3789040"/>
+            <a:off x="6228184" y="3789040"/>
             <a:ext cx="2664296" cy="0"/>
           </a:xfrm>
           <a:prstGeom prst="line">
@@ -8077,7 +8676,7 @@
         </p:nvCxnSpPr>
         <p:spPr>
           <a:xfrm>
-            <a:off x="5076056" y="4221088"/>
+            <a:off x="6228184" y="4221088"/>
             <a:ext cx="2664296" cy="0"/>
           </a:xfrm>
           <a:prstGeom prst="line">
@@ -8114,7 +8713,7 @@
         </p:nvCxnSpPr>
         <p:spPr>
           <a:xfrm>
-            <a:off x="5076056" y="4725144"/>
+            <a:off x="6228184" y="4725144"/>
             <a:ext cx="2664296" cy="0"/>
           </a:xfrm>
           <a:prstGeom prst="line">
@@ -8151,7 +8750,7 @@
         </p:nvSpPr>
         <p:spPr>
           <a:xfrm>
-            <a:off x="5364088" y="2564904"/>
+            <a:off x="6516216" y="2564904"/>
             <a:ext cx="1728192" cy="230832"/>
           </a:xfrm>
           <a:prstGeom prst="rect">
@@ -8189,7 +8788,7 @@
         </p:nvSpPr>
         <p:spPr>
           <a:xfrm>
-            <a:off x="5148064" y="2564904"/>
+            <a:off x="6300192" y="2564904"/>
             <a:ext cx="216024" cy="216024"/>
           </a:xfrm>
           <a:prstGeom prst="rect">
@@ -8228,7 +8827,7 @@
         </p:nvSpPr>
         <p:spPr>
           <a:xfrm>
-            <a:off x="7092280" y="5085184"/>
+            <a:off x="8244408" y="5085184"/>
             <a:ext cx="504056" cy="360040"/>
           </a:xfrm>
           <a:prstGeom prst="rect">
@@ -8272,7 +8871,7 @@
         </p:nvSpPr>
         <p:spPr>
           <a:xfrm>
-            <a:off x="7092280" y="2564904"/>
+            <a:off x="8244408" y="2564904"/>
             <a:ext cx="576064" cy="216024"/>
           </a:xfrm>
           <a:prstGeom prst="rect">
@@ -8316,7 +8915,7 @@
         </p:nvSpPr>
         <p:spPr>
           <a:xfrm>
-            <a:off x="5364088" y="2996952"/>
+            <a:off x="6516216" y="2996952"/>
             <a:ext cx="1728192" cy="230832"/>
           </a:xfrm>
           <a:prstGeom prst="rect">
@@ -8354,7 +8953,7 @@
         </p:nvSpPr>
         <p:spPr>
           <a:xfrm>
-            <a:off x="5148064" y="2996952"/>
+            <a:off x="6300192" y="2996952"/>
             <a:ext cx="216024" cy="216024"/>
           </a:xfrm>
           <a:prstGeom prst="rect">
@@ -8393,7 +8992,7 @@
         </p:nvSpPr>
         <p:spPr>
           <a:xfrm>
-            <a:off x="7092280" y="2996952"/>
+            <a:off x="8244408" y="2996952"/>
             <a:ext cx="576064" cy="216024"/>
           </a:xfrm>
           <a:prstGeom prst="rect">
@@ -8437,7 +9036,7 @@
         </p:nvSpPr>
         <p:spPr>
           <a:xfrm>
-            <a:off x="5364088" y="3429000"/>
+            <a:off x="6516216" y="3429000"/>
             <a:ext cx="1728192" cy="230832"/>
           </a:xfrm>
           <a:prstGeom prst="rect">
@@ -8475,7 +9074,7 @@
         </p:nvSpPr>
         <p:spPr>
           <a:xfrm>
-            <a:off x="5148064" y="3429000"/>
+            <a:off x="6300192" y="3429000"/>
             <a:ext cx="216024" cy="216024"/>
           </a:xfrm>
           <a:prstGeom prst="rect">
@@ -8514,7 +9113,7 @@
         </p:nvSpPr>
         <p:spPr>
           <a:xfrm>
-            <a:off x="7092280" y="3429000"/>
+            <a:off x="8244408" y="3429000"/>
             <a:ext cx="576064" cy="216024"/>
           </a:xfrm>
           <a:prstGeom prst="rect">
@@ -8558,7 +9157,7 @@
         </p:nvSpPr>
         <p:spPr>
           <a:xfrm>
-            <a:off x="5364088" y="3861048"/>
+            <a:off x="6516216" y="3861048"/>
             <a:ext cx="1728192" cy="230832"/>
           </a:xfrm>
           <a:prstGeom prst="rect">
@@ -8596,7 +9195,7 @@
         </p:nvSpPr>
         <p:spPr>
           <a:xfrm>
-            <a:off x="5148064" y="3861048"/>
+            <a:off x="6300192" y="3861048"/>
             <a:ext cx="216024" cy="216024"/>
           </a:xfrm>
           <a:prstGeom prst="rect">
@@ -8635,7 +9234,7 @@
         </p:nvSpPr>
         <p:spPr>
           <a:xfrm>
-            <a:off x="7092280" y="3861048"/>
+            <a:off x="8244408" y="3861048"/>
             <a:ext cx="576064" cy="216024"/>
           </a:xfrm>
           <a:prstGeom prst="rect">
@@ -8679,7 +9278,7 @@
         </p:nvSpPr>
         <p:spPr>
           <a:xfrm>
-            <a:off x="5364088" y="4365104"/>
+            <a:off x="6516216" y="4365104"/>
             <a:ext cx="1728192" cy="230832"/>
           </a:xfrm>
           <a:prstGeom prst="rect">
@@ -8717,7 +9316,7 @@
         </p:nvSpPr>
         <p:spPr>
           <a:xfrm>
-            <a:off x="5148064" y="4365104"/>
+            <a:off x="6300192" y="4365104"/>
             <a:ext cx="216024" cy="216024"/>
           </a:xfrm>
           <a:prstGeom prst="rect">
@@ -8756,7 +9355,7 @@
         </p:nvSpPr>
         <p:spPr>
           <a:xfrm>
-            <a:off x="7092280" y="4365104"/>
+            <a:off x="8244408" y="4365104"/>
             <a:ext cx="576064" cy="216024"/>
           </a:xfrm>
           <a:prstGeom prst="rect">
@@ -8792,6 +9391,560 @@
           </a:p>
         </p:txBody>
       </p:sp>
+      <p:sp>
+        <p:nvSpPr>
+          <p:cNvPr id="50" name="직사각형 49"/>
+          <p:cNvSpPr/>
+          <p:nvPr/>
+        </p:nvSpPr>
+        <p:spPr>
+          <a:xfrm>
+            <a:off x="323528" y="908720"/>
+            <a:ext cx="2664296" cy="4752528"/>
+          </a:xfrm>
+          <a:prstGeom prst="rect">
+            <a:avLst/>
+          </a:prstGeom>
+        </p:spPr>
+        <p:style>
+          <a:lnRef idx="2">
+            <a:schemeClr val="dk1"/>
+          </a:lnRef>
+          <a:fillRef idx="1">
+            <a:schemeClr val="lt1"/>
+          </a:fillRef>
+          <a:effectRef idx="0">
+            <a:schemeClr val="dk1"/>
+          </a:effectRef>
+          <a:fontRef idx="minor">
+            <a:schemeClr val="dk1"/>
+          </a:fontRef>
+        </p:style>
+        <p:txBody>
+          <a:bodyPr rtlCol="0" anchor="ctr"/>
+          <a:lstStyle/>
+          <a:p>
+            <a:pPr algn="ctr"/>
+            <a:endParaRPr lang="ko-KR" altLang="en-US"/>
+          </a:p>
+        </p:txBody>
+      </p:sp>
+      <p:sp>
+        <p:nvSpPr>
+          <p:cNvPr id="51" name="TextBox 50"/>
+          <p:cNvSpPr txBox="1"/>
+          <p:nvPr/>
+        </p:nvSpPr>
+        <p:spPr>
+          <a:xfrm>
+            <a:off x="395536" y="980728"/>
+            <a:ext cx="1512168" cy="369332"/>
+          </a:xfrm>
+          <a:prstGeom prst="rect">
+            <a:avLst/>
+          </a:prstGeom>
+          <a:noFill/>
+        </p:spPr>
+        <p:txBody>
+          <a:bodyPr wrap="square" rtlCol="0">
+            <a:spAutoFit/>
+          </a:bodyPr>
+          <a:lstStyle/>
+          <a:p>
+            <a:r>
+              <a:rPr lang="en-US" altLang="ko-KR" dirty="0" smtClean="0"/>
+              <a:t>MY PAGE</a:t>
+            </a:r>
+            <a:endParaRPr lang="ko-KR" altLang="en-US" dirty="0"/>
+          </a:p>
+        </p:txBody>
+      </p:sp>
+      <p:sp>
+        <p:nvSpPr>
+          <p:cNvPr id="52" name="TextBox 51"/>
+          <p:cNvSpPr txBox="1"/>
+          <p:nvPr/>
+        </p:nvSpPr>
+        <p:spPr>
+          <a:xfrm>
+            <a:off x="395536" y="1844824"/>
+            <a:ext cx="1080120" cy="261610"/>
+          </a:xfrm>
+          <a:prstGeom prst="rect">
+            <a:avLst/>
+          </a:prstGeom>
+          <a:noFill/>
+        </p:spPr>
+        <p:txBody>
+          <a:bodyPr wrap="square" rtlCol="0">
+            <a:spAutoFit/>
+          </a:bodyPr>
+          <a:lstStyle/>
+          <a:p>
+            <a:r>
+              <a:rPr lang="ko-KR" altLang="en-US" sz="1100" dirty="0" smtClean="0"/>
+              <a:t>판매중인 의류</a:t>
+            </a:r>
+            <a:endParaRPr lang="ko-KR" altLang="en-US" sz="1100" dirty="0"/>
+          </a:p>
+        </p:txBody>
+      </p:sp>
+      <p:sp>
+        <p:nvSpPr>
+          <p:cNvPr id="68" name="직사각형 67"/>
+          <p:cNvSpPr/>
+          <p:nvPr/>
+        </p:nvSpPr>
+        <p:spPr>
+          <a:xfrm>
+            <a:off x="1547664" y="1772816"/>
+            <a:ext cx="720080" cy="288032"/>
+          </a:xfrm>
+          <a:prstGeom prst="rect">
+            <a:avLst/>
+          </a:prstGeom>
+        </p:spPr>
+        <p:style>
+          <a:lnRef idx="2">
+            <a:schemeClr val="dk1"/>
+          </a:lnRef>
+          <a:fillRef idx="1">
+            <a:schemeClr val="lt1"/>
+          </a:fillRef>
+          <a:effectRef idx="0">
+            <a:schemeClr val="dk1"/>
+          </a:effectRef>
+          <a:fontRef idx="minor">
+            <a:schemeClr val="dk1"/>
+          </a:fontRef>
+        </p:style>
+        <p:txBody>
+          <a:bodyPr rtlCol="0" anchor="ctr"/>
+          <a:lstStyle/>
+          <a:p>
+            <a:pPr algn="ctr"/>
+            <a:r>
+              <a:rPr lang="en-US" altLang="ko-KR" sz="1400" dirty="0" smtClean="0"/>
+              <a:t>3</a:t>
+            </a:r>
+            <a:endParaRPr lang="ko-KR" altLang="en-US" sz="1400" dirty="0"/>
+          </a:p>
+        </p:txBody>
+      </p:sp>
+      <p:cxnSp>
+        <p:nvCxnSpPr>
+          <p:cNvPr id="69" name="직선 연결선 68"/>
+          <p:cNvCxnSpPr/>
+          <p:nvPr/>
+        </p:nvCxnSpPr>
+        <p:spPr>
+          <a:xfrm>
+            <a:off x="323528" y="2406080"/>
+            <a:ext cx="2664296" cy="0"/>
+          </a:xfrm>
+          <a:prstGeom prst="line">
+            <a:avLst/>
+          </a:prstGeom>
+          <a:ln>
+            <a:solidFill>
+              <a:schemeClr val="bg1">
+                <a:lumMod val="65000"/>
+              </a:schemeClr>
+            </a:solidFill>
+          </a:ln>
+        </p:spPr>
+        <p:style>
+          <a:lnRef idx="1">
+            <a:schemeClr val="accent1"/>
+          </a:lnRef>
+          <a:fillRef idx="0">
+            <a:schemeClr val="accent1"/>
+          </a:fillRef>
+          <a:effectRef idx="0">
+            <a:schemeClr val="accent1"/>
+          </a:effectRef>
+          <a:fontRef idx="minor">
+            <a:schemeClr val="tx1"/>
+          </a:fontRef>
+        </p:style>
+      </p:cxnSp>
+      <p:sp>
+        <p:nvSpPr>
+          <p:cNvPr id="70" name="TextBox 69"/>
+          <p:cNvSpPr txBox="1"/>
+          <p:nvPr/>
+        </p:nvSpPr>
+        <p:spPr>
+          <a:xfrm>
+            <a:off x="467544" y="2478088"/>
+            <a:ext cx="2376264" cy="230832"/>
+          </a:xfrm>
+          <a:prstGeom prst="rect">
+            <a:avLst/>
+          </a:prstGeom>
+          <a:noFill/>
+        </p:spPr>
+        <p:txBody>
+          <a:bodyPr wrap="square" rtlCol="0">
+            <a:spAutoFit/>
+          </a:bodyPr>
+          <a:lstStyle/>
+          <a:p>
+            <a:r>
+              <a:rPr lang="en-US" altLang="ko-KR" sz="900" dirty="0" smtClean="0"/>
+              <a:t>A    </a:t>
+            </a:r>
+            <a:r>
+              <a:rPr lang="en-US" altLang="ko-KR" sz="900" dirty="0" err="1" smtClean="0"/>
+              <a:t>aaa</a:t>
+            </a:r>
+            <a:r>
+              <a:rPr lang="en-US" altLang="ko-KR" sz="900" dirty="0" smtClean="0"/>
+              <a:t>       \15000   2      </a:t>
+            </a:r>
+            <a:r>
+              <a:rPr lang="en-US" altLang="ko-KR" sz="900" dirty="0" err="1" smtClean="0"/>
+              <a:t>yyyy.mm.dd</a:t>
+            </a:r>
+            <a:r>
+              <a:rPr lang="en-US" altLang="ko-KR" sz="900" dirty="0" smtClean="0"/>
+              <a:t>            </a:t>
+            </a:r>
+            <a:endParaRPr lang="ko-KR" altLang="en-US" sz="900" dirty="0"/>
+          </a:p>
+        </p:txBody>
+      </p:sp>
+      <p:sp>
+        <p:nvSpPr>
+          <p:cNvPr id="71" name="TextBox 70"/>
+          <p:cNvSpPr txBox="1"/>
+          <p:nvPr/>
+        </p:nvSpPr>
+        <p:spPr>
+          <a:xfrm>
+            <a:off x="323528" y="2132856"/>
+            <a:ext cx="2736304" cy="230832"/>
+          </a:xfrm>
+          <a:prstGeom prst="rect">
+            <a:avLst/>
+          </a:prstGeom>
+          <a:noFill/>
+        </p:spPr>
+        <p:txBody>
+          <a:bodyPr wrap="square" rtlCol="0">
+            <a:spAutoFit/>
+          </a:bodyPr>
+          <a:lstStyle/>
+          <a:p>
+            <a:r>
+              <a:rPr lang="ko-KR" altLang="en-US" sz="900" dirty="0" smtClean="0"/>
+              <a:t>상품명</a:t>
+            </a:r>
+            <a:r>
+              <a:rPr lang="en-US" altLang="ko-KR" sz="900" dirty="0" smtClean="0"/>
+              <a:t> </a:t>
+            </a:r>
+            <a:r>
+              <a:rPr lang="en-US" altLang="ko-KR" sz="900" dirty="0" smtClean="0"/>
+              <a:t> </a:t>
+            </a:r>
+            <a:r>
+              <a:rPr lang="ko-KR" altLang="en-US" sz="900" dirty="0" smtClean="0"/>
+              <a:t>회사명</a:t>
+            </a:r>
+            <a:r>
+              <a:rPr lang="en-US" altLang="ko-KR" sz="900" dirty="0" smtClean="0"/>
+              <a:t>  </a:t>
+            </a:r>
+            <a:r>
+              <a:rPr lang="ko-KR" altLang="en-US" sz="900" dirty="0" smtClean="0"/>
+              <a:t>가격</a:t>
+            </a:r>
+            <a:r>
+              <a:rPr lang="en-US" altLang="ko-KR" sz="900" dirty="0" smtClean="0"/>
+              <a:t>      </a:t>
+            </a:r>
+            <a:r>
+              <a:rPr lang="ko-KR" altLang="en-US" sz="900" dirty="0" smtClean="0"/>
+              <a:t>수량</a:t>
+            </a:r>
+            <a:r>
+              <a:rPr lang="en-US" altLang="ko-KR" sz="900" dirty="0" smtClean="0"/>
+              <a:t>   </a:t>
+            </a:r>
+            <a:r>
+              <a:rPr lang="ko-KR" altLang="en-US" sz="900" dirty="0" smtClean="0"/>
+              <a:t>판매 종료일</a:t>
+            </a:r>
+            <a:endParaRPr lang="ko-KR" altLang="en-US" sz="900" dirty="0"/>
+          </a:p>
+        </p:txBody>
+      </p:sp>
+      <p:sp>
+        <p:nvSpPr>
+          <p:cNvPr id="72" name="모서리가 둥근 직사각형 71"/>
+          <p:cNvSpPr/>
+          <p:nvPr/>
+        </p:nvSpPr>
+        <p:spPr>
+          <a:xfrm>
+            <a:off x="683568" y="4653136"/>
+            <a:ext cx="1944216" cy="360040"/>
+          </a:xfrm>
+          <a:prstGeom prst="roundRect">
+            <a:avLst/>
+          </a:prstGeom>
+        </p:spPr>
+        <p:style>
+          <a:lnRef idx="2">
+            <a:schemeClr val="accent2"/>
+          </a:lnRef>
+          <a:fillRef idx="1">
+            <a:schemeClr val="lt1"/>
+          </a:fillRef>
+          <a:effectRef idx="0">
+            <a:schemeClr val="accent2"/>
+          </a:effectRef>
+          <a:fontRef idx="minor">
+            <a:schemeClr val="dk1"/>
+          </a:fontRef>
+        </p:style>
+        <p:txBody>
+          <a:bodyPr rtlCol="0" anchor="ctr"/>
+          <a:lstStyle/>
+          <a:p>
+            <a:pPr algn="ctr"/>
+            <a:r>
+              <a:rPr lang="ko-KR" altLang="en-US" dirty="0" smtClean="0">
+                <a:solidFill>
+                  <a:srgbClr val="FF0000"/>
+                </a:solidFill>
+              </a:rPr>
+              <a:t>회원 탈퇴</a:t>
+            </a:r>
+            <a:endParaRPr lang="ko-KR" altLang="en-US" dirty="0">
+              <a:solidFill>
+                <a:srgbClr val="FF0000"/>
+              </a:solidFill>
+            </a:endParaRPr>
+          </a:p>
+        </p:txBody>
+      </p:sp>
+      <p:cxnSp>
+        <p:nvCxnSpPr>
+          <p:cNvPr id="73" name="직선 연결선 72"/>
+          <p:cNvCxnSpPr/>
+          <p:nvPr/>
+        </p:nvCxnSpPr>
+        <p:spPr>
+          <a:xfrm>
+            <a:off x="323528" y="2766120"/>
+            <a:ext cx="2664296" cy="0"/>
+          </a:xfrm>
+          <a:prstGeom prst="line">
+            <a:avLst/>
+          </a:prstGeom>
+          <a:ln>
+            <a:solidFill>
+              <a:schemeClr val="bg1">
+                <a:lumMod val="65000"/>
+              </a:schemeClr>
+            </a:solidFill>
+          </a:ln>
+        </p:spPr>
+        <p:style>
+          <a:lnRef idx="1">
+            <a:schemeClr val="accent1"/>
+          </a:lnRef>
+          <a:fillRef idx="0">
+            <a:schemeClr val="accent1"/>
+          </a:fillRef>
+          <a:effectRef idx="0">
+            <a:schemeClr val="accent1"/>
+          </a:effectRef>
+          <a:fontRef idx="minor">
+            <a:schemeClr val="tx1"/>
+          </a:fontRef>
+        </p:style>
+      </p:cxnSp>
+      <p:sp>
+        <p:nvSpPr>
+          <p:cNvPr id="74" name="TextBox 73"/>
+          <p:cNvSpPr txBox="1"/>
+          <p:nvPr/>
+        </p:nvSpPr>
+        <p:spPr>
+          <a:xfrm>
+            <a:off x="467544" y="2838128"/>
+            <a:ext cx="2376264" cy="230832"/>
+          </a:xfrm>
+          <a:prstGeom prst="rect">
+            <a:avLst/>
+          </a:prstGeom>
+          <a:noFill/>
+        </p:spPr>
+        <p:txBody>
+          <a:bodyPr wrap="square" rtlCol="0">
+            <a:spAutoFit/>
+          </a:bodyPr>
+          <a:lstStyle/>
+          <a:p>
+            <a:r>
+              <a:rPr lang="en-US" altLang="ko-KR" sz="900" dirty="0" smtClean="0"/>
+              <a:t>B    </a:t>
+            </a:r>
+            <a:r>
+              <a:rPr lang="en-US" altLang="ko-KR" sz="900" dirty="0" err="1" smtClean="0"/>
+              <a:t>bbb</a:t>
+            </a:r>
+            <a:r>
+              <a:rPr lang="en-US" altLang="ko-KR" sz="900" dirty="0" smtClean="0"/>
+              <a:t>      \250000  1      </a:t>
+            </a:r>
+            <a:r>
+              <a:rPr lang="en-US" altLang="ko-KR" sz="900" dirty="0" err="1" smtClean="0"/>
+              <a:t>yyyy.mm.dd</a:t>
+            </a:r>
+            <a:r>
+              <a:rPr lang="en-US" altLang="ko-KR" sz="900" dirty="0" smtClean="0"/>
+              <a:t>            </a:t>
+            </a:r>
+            <a:endParaRPr lang="ko-KR" altLang="en-US" sz="900" dirty="0"/>
+          </a:p>
+        </p:txBody>
+      </p:sp>
+      <p:cxnSp>
+        <p:nvCxnSpPr>
+          <p:cNvPr id="75" name="직선 연결선 74"/>
+          <p:cNvCxnSpPr/>
+          <p:nvPr/>
+        </p:nvCxnSpPr>
+        <p:spPr>
+          <a:xfrm>
+            <a:off x="323528" y="3126160"/>
+            <a:ext cx="2664296" cy="0"/>
+          </a:xfrm>
+          <a:prstGeom prst="line">
+            <a:avLst/>
+          </a:prstGeom>
+          <a:ln>
+            <a:solidFill>
+              <a:schemeClr val="bg1">
+                <a:lumMod val="65000"/>
+              </a:schemeClr>
+            </a:solidFill>
+          </a:ln>
+        </p:spPr>
+        <p:style>
+          <a:lnRef idx="1">
+            <a:schemeClr val="accent1"/>
+          </a:lnRef>
+          <a:fillRef idx="0">
+            <a:schemeClr val="accent1"/>
+          </a:fillRef>
+          <a:effectRef idx="0">
+            <a:schemeClr val="accent1"/>
+          </a:effectRef>
+          <a:fontRef idx="minor">
+            <a:schemeClr val="tx1"/>
+          </a:fontRef>
+        </p:style>
+      </p:cxnSp>
+      <p:sp>
+        <p:nvSpPr>
+          <p:cNvPr id="76" name="TextBox 75"/>
+          <p:cNvSpPr txBox="1"/>
+          <p:nvPr/>
+        </p:nvSpPr>
+        <p:spPr>
+          <a:xfrm>
+            <a:off x="467544" y="3198168"/>
+            <a:ext cx="2376264" cy="230832"/>
+          </a:xfrm>
+          <a:prstGeom prst="rect">
+            <a:avLst/>
+          </a:prstGeom>
+          <a:noFill/>
+        </p:spPr>
+        <p:txBody>
+          <a:bodyPr wrap="square" rtlCol="0">
+            <a:spAutoFit/>
+          </a:bodyPr>
+          <a:lstStyle/>
+          <a:p>
+            <a:r>
+              <a:rPr lang="en-US" altLang="ko-KR" sz="900" dirty="0" smtClean="0"/>
+              <a:t>C</a:t>
+            </a:r>
+            <a:r>
+              <a:rPr lang="en-US" altLang="ko-KR" sz="900" dirty="0" smtClean="0"/>
+              <a:t>    </a:t>
+            </a:r>
+            <a:r>
+              <a:rPr lang="en-US" altLang="ko-KR" sz="900" dirty="0" err="1" smtClean="0"/>
+              <a:t>ccc</a:t>
+            </a:r>
+            <a:r>
+              <a:rPr lang="en-US" altLang="ko-KR" sz="900" dirty="0" smtClean="0"/>
+              <a:t>       \</a:t>
+            </a:r>
+            <a:r>
+              <a:rPr lang="en-US" altLang="ko-KR" sz="900" dirty="0" smtClean="0"/>
+              <a:t>6</a:t>
+            </a:r>
+            <a:r>
+              <a:rPr lang="en-US" altLang="ko-KR" sz="900" dirty="0" smtClean="0"/>
+              <a:t>5000    4      </a:t>
+            </a:r>
+            <a:r>
+              <a:rPr lang="en-US" altLang="ko-KR" sz="900" dirty="0" err="1" smtClean="0"/>
+              <a:t>yyyy.mm.dd</a:t>
+            </a:r>
+            <a:r>
+              <a:rPr lang="en-US" altLang="ko-KR" sz="900" dirty="0" smtClean="0"/>
+              <a:t>            </a:t>
+            </a:r>
+            <a:endParaRPr lang="ko-KR" altLang="en-US" sz="900" dirty="0"/>
+          </a:p>
+        </p:txBody>
+      </p:sp>
+      <p:cxnSp>
+        <p:nvCxnSpPr>
+          <p:cNvPr id="77" name="직선 연결선 76"/>
+          <p:cNvCxnSpPr/>
+          <p:nvPr/>
+        </p:nvCxnSpPr>
+        <p:spPr>
+          <a:xfrm>
+            <a:off x="323528" y="3501008"/>
+            <a:ext cx="2664296" cy="0"/>
+          </a:xfrm>
+          <a:prstGeom prst="line">
+            <a:avLst/>
+          </a:prstGeom>
+          <a:ln>
+            <a:solidFill>
+              <a:schemeClr val="bg1">
+                <a:lumMod val="65000"/>
+              </a:schemeClr>
+            </a:solidFill>
+          </a:ln>
+        </p:spPr>
+        <p:style>
+          <a:lnRef idx="1">
+            <a:schemeClr val="accent1"/>
+          </a:lnRef>
+          <a:fillRef idx="0">
+            <a:schemeClr val="accent1"/>
+          </a:fillRef>
+          <a:effectRef idx="0">
+            <a:schemeClr val="accent1"/>
+          </a:effectRef>
+          <a:fontRef idx="minor">
+            <a:schemeClr val="tx1"/>
+          </a:fontRef>
+        </p:style>
+      </p:cxnSp>
     </p:spTree>
   </p:cSld>
   <p:clrMapOvr>
@@ -11708,11 +12861,7 @@
             <a:pPr algn="ctr"/>
             <a:r>
               <a:rPr lang="ko-KR" altLang="en-US" sz="1050" dirty="0" smtClean="0"/>
-              <a:t>아니</a:t>
-            </a:r>
-            <a:r>
-              <a:rPr lang="ko-KR" altLang="en-US" sz="1050" dirty="0" smtClean="0"/>
-              <a:t>오</a:t>
+              <a:t>아니오</a:t>
             </a:r>
             <a:endParaRPr lang="ko-KR" altLang="en-US" sz="1050" dirty="0"/>
           </a:p>
@@ -12413,6 +13562,1647 @@
               <a:rPr lang="ko-KR" altLang="en-US" dirty="0" smtClean="0"/>
               <a:t>가입하기</a:t>
             </a:r>
+            <a:endParaRPr lang="ko-KR" altLang="en-US" dirty="0"/>
+          </a:p>
+        </p:txBody>
+      </p:sp>
+    </p:spTree>
+  </p:cSld>
+  <p:clrMapOvr>
+    <a:masterClrMapping/>
+  </p:clrMapOvr>
+</p:sld>
+</file>
+
+<file path=ppt/slides/slide5.xml><?xml version="1.0" encoding="utf-8"?>
+<p:sld xmlns:a="http://schemas.openxmlformats.org/drawingml/2006/main" xmlns:r="http://schemas.openxmlformats.org/officeDocument/2006/relationships" xmlns:p="http://schemas.openxmlformats.org/presentationml/2006/main">
+  <p:cSld>
+    <p:spTree>
+      <p:nvGrpSpPr>
+        <p:cNvPr id="1" name=""/>
+        <p:cNvGrpSpPr/>
+        <p:nvPr/>
+      </p:nvGrpSpPr>
+      <p:grpSpPr>
+        <a:xfrm>
+          <a:off x="0" y="0"/>
+          <a:ext cx="0" cy="0"/>
+          <a:chOff x="0" y="0"/>
+          <a:chExt cx="0" cy="0"/>
+        </a:xfrm>
+      </p:grpSpPr>
+      <p:sp>
+        <p:nvSpPr>
+          <p:cNvPr id="5" name="직사각형 4"/>
+          <p:cNvSpPr/>
+          <p:nvPr/>
+        </p:nvSpPr>
+        <p:spPr>
+          <a:xfrm>
+            <a:off x="395536" y="836712"/>
+            <a:ext cx="2664296" cy="4752528"/>
+          </a:xfrm>
+          <a:prstGeom prst="rect">
+            <a:avLst/>
+          </a:prstGeom>
+        </p:spPr>
+        <p:style>
+          <a:lnRef idx="2">
+            <a:schemeClr val="dk1"/>
+          </a:lnRef>
+          <a:fillRef idx="1">
+            <a:schemeClr val="lt1"/>
+          </a:fillRef>
+          <a:effectRef idx="0">
+            <a:schemeClr val="dk1"/>
+          </a:effectRef>
+          <a:fontRef idx="minor">
+            <a:schemeClr val="dk1"/>
+          </a:fontRef>
+        </p:style>
+        <p:txBody>
+          <a:bodyPr rtlCol="0" anchor="ctr"/>
+          <a:lstStyle/>
+          <a:p>
+            <a:pPr algn="ctr"/>
+            <a:endParaRPr lang="ko-KR" altLang="en-US"/>
+          </a:p>
+        </p:txBody>
+      </p:sp>
+      <p:sp>
+        <p:nvSpPr>
+          <p:cNvPr id="6" name="TextBox 5"/>
+          <p:cNvSpPr txBox="1"/>
+          <p:nvPr/>
+        </p:nvSpPr>
+        <p:spPr>
+          <a:xfrm>
+            <a:off x="539552" y="1052736"/>
+            <a:ext cx="1512168" cy="369332"/>
+          </a:xfrm>
+          <a:prstGeom prst="rect">
+            <a:avLst/>
+          </a:prstGeom>
+          <a:noFill/>
+        </p:spPr>
+        <p:txBody>
+          <a:bodyPr wrap="square" rtlCol="0">
+            <a:spAutoFit/>
+          </a:bodyPr>
+          <a:lstStyle/>
+          <a:p>
+            <a:r>
+              <a:rPr lang="en-US" altLang="ko-KR" dirty="0" smtClean="0"/>
+              <a:t>MY PAGE</a:t>
+            </a:r>
+            <a:endParaRPr lang="ko-KR" altLang="en-US" dirty="0"/>
+          </a:p>
+        </p:txBody>
+      </p:sp>
+      <p:sp>
+        <p:nvSpPr>
+          <p:cNvPr id="7" name="TextBox 6"/>
+          <p:cNvSpPr txBox="1"/>
+          <p:nvPr/>
+        </p:nvSpPr>
+        <p:spPr>
+          <a:xfrm>
+            <a:off x="539552" y="1423809"/>
+            <a:ext cx="1008112" cy="276999"/>
+          </a:xfrm>
+          <a:prstGeom prst="rect">
+            <a:avLst/>
+          </a:prstGeom>
+          <a:noFill/>
+        </p:spPr>
+        <p:txBody>
+          <a:bodyPr wrap="square" rtlCol="0">
+            <a:spAutoFit/>
+          </a:bodyPr>
+          <a:lstStyle/>
+          <a:p>
+            <a:r>
+              <a:rPr lang="ko-KR" altLang="en-US" sz="1200" dirty="0" smtClean="0"/>
+              <a:t>구매 내역</a:t>
+            </a:r>
+            <a:endParaRPr lang="ko-KR" altLang="en-US" sz="1200" dirty="0"/>
+          </a:p>
+        </p:txBody>
+      </p:sp>
+      <p:sp>
+        <p:nvSpPr>
+          <p:cNvPr id="8" name="직사각형 7"/>
+          <p:cNvSpPr/>
+          <p:nvPr/>
+        </p:nvSpPr>
+        <p:spPr>
+          <a:xfrm>
+            <a:off x="611560" y="1700808"/>
+            <a:ext cx="792088" cy="288032"/>
+          </a:xfrm>
+          <a:prstGeom prst="rect">
+            <a:avLst/>
+          </a:prstGeom>
+        </p:spPr>
+        <p:style>
+          <a:lnRef idx="2">
+            <a:schemeClr val="dk1"/>
+          </a:lnRef>
+          <a:fillRef idx="1">
+            <a:schemeClr val="lt1"/>
+          </a:fillRef>
+          <a:effectRef idx="0">
+            <a:schemeClr val="dk1"/>
+          </a:effectRef>
+          <a:fontRef idx="minor">
+            <a:schemeClr val="dk1"/>
+          </a:fontRef>
+        </p:style>
+        <p:txBody>
+          <a:bodyPr rtlCol="0" anchor="ctr"/>
+          <a:lstStyle/>
+          <a:p>
+            <a:pPr algn="ctr"/>
+            <a:r>
+              <a:rPr lang="en-US" altLang="ko-KR" sz="800" dirty="0" err="1" smtClean="0"/>
+              <a:t>yyyy.mm.dd</a:t>
+            </a:r>
+            <a:endParaRPr lang="ko-KR" altLang="en-US" sz="800" dirty="0"/>
+          </a:p>
+        </p:txBody>
+      </p:sp>
+      <p:sp>
+        <p:nvSpPr>
+          <p:cNvPr id="9" name="TextBox 8"/>
+          <p:cNvSpPr txBox="1"/>
+          <p:nvPr/>
+        </p:nvSpPr>
+        <p:spPr>
+          <a:xfrm>
+            <a:off x="1403648" y="1628800"/>
+            <a:ext cx="360040" cy="369332"/>
+          </a:xfrm>
+          <a:prstGeom prst="rect">
+            <a:avLst/>
+          </a:prstGeom>
+          <a:noFill/>
+        </p:spPr>
+        <p:txBody>
+          <a:bodyPr wrap="square" rtlCol="0">
+            <a:spAutoFit/>
+          </a:bodyPr>
+          <a:lstStyle/>
+          <a:p>
+            <a:r>
+              <a:rPr lang="en-US" altLang="ko-KR" dirty="0" smtClean="0"/>
+              <a:t>~</a:t>
+            </a:r>
+            <a:endParaRPr lang="ko-KR" altLang="en-US" dirty="0"/>
+          </a:p>
+        </p:txBody>
+      </p:sp>
+      <p:sp>
+        <p:nvSpPr>
+          <p:cNvPr id="10" name="직사각형 9"/>
+          <p:cNvSpPr/>
+          <p:nvPr/>
+        </p:nvSpPr>
+        <p:spPr>
+          <a:xfrm>
+            <a:off x="1691680" y="1700808"/>
+            <a:ext cx="792088" cy="288032"/>
+          </a:xfrm>
+          <a:prstGeom prst="rect">
+            <a:avLst/>
+          </a:prstGeom>
+        </p:spPr>
+        <p:style>
+          <a:lnRef idx="2">
+            <a:schemeClr val="dk1"/>
+          </a:lnRef>
+          <a:fillRef idx="1">
+            <a:schemeClr val="lt1"/>
+          </a:fillRef>
+          <a:effectRef idx="0">
+            <a:schemeClr val="dk1"/>
+          </a:effectRef>
+          <a:fontRef idx="minor">
+            <a:schemeClr val="dk1"/>
+          </a:fontRef>
+        </p:style>
+        <p:txBody>
+          <a:bodyPr rtlCol="0" anchor="ctr"/>
+          <a:lstStyle/>
+          <a:p>
+            <a:pPr algn="ctr"/>
+            <a:r>
+              <a:rPr lang="en-US" altLang="ko-KR" sz="800" dirty="0" err="1" smtClean="0"/>
+              <a:t>yyyy.mm.dd</a:t>
+            </a:r>
+            <a:endParaRPr lang="ko-KR" altLang="en-US" sz="800" dirty="0"/>
+          </a:p>
+        </p:txBody>
+      </p:sp>
+      <p:sp>
+        <p:nvSpPr>
+          <p:cNvPr id="11" name="모서리가 둥근 직사각형 10"/>
+          <p:cNvSpPr/>
+          <p:nvPr/>
+        </p:nvSpPr>
+        <p:spPr>
+          <a:xfrm>
+            <a:off x="2555776" y="1700808"/>
+            <a:ext cx="432048" cy="288032"/>
+          </a:xfrm>
+          <a:prstGeom prst="roundRect">
+            <a:avLst>
+              <a:gd name="adj" fmla="val 46902"/>
+            </a:avLst>
+          </a:prstGeom>
+        </p:spPr>
+        <p:style>
+          <a:lnRef idx="2">
+            <a:schemeClr val="accent1">
+              <a:shade val="50000"/>
+            </a:schemeClr>
+          </a:lnRef>
+          <a:fillRef idx="1">
+            <a:schemeClr val="accent1"/>
+          </a:fillRef>
+          <a:effectRef idx="0">
+            <a:schemeClr val="accent1"/>
+          </a:effectRef>
+          <a:fontRef idx="minor">
+            <a:schemeClr val="lt1"/>
+          </a:fontRef>
+        </p:style>
+        <p:txBody>
+          <a:bodyPr rtlCol="0" anchor="ctr"/>
+          <a:lstStyle/>
+          <a:p>
+            <a:pPr algn="ctr"/>
+            <a:endParaRPr lang="ko-KR" altLang="en-US" sz="900" dirty="0"/>
+          </a:p>
+        </p:txBody>
+      </p:sp>
+      <p:sp>
+        <p:nvSpPr>
+          <p:cNvPr id="12" name="TextBox 11"/>
+          <p:cNvSpPr txBox="1"/>
+          <p:nvPr/>
+        </p:nvSpPr>
+        <p:spPr>
+          <a:xfrm>
+            <a:off x="755576" y="2060848"/>
+            <a:ext cx="2304256" cy="261610"/>
+          </a:xfrm>
+          <a:prstGeom prst="rect">
+            <a:avLst/>
+          </a:prstGeom>
+          <a:noFill/>
+        </p:spPr>
+        <p:txBody>
+          <a:bodyPr wrap="square" rtlCol="0">
+            <a:spAutoFit/>
+          </a:bodyPr>
+          <a:lstStyle/>
+          <a:p>
+            <a:r>
+              <a:rPr lang="ko-KR" altLang="en-US" sz="1100" dirty="0" smtClean="0"/>
+              <a:t>날짜</a:t>
+            </a:r>
+            <a:r>
+              <a:rPr lang="en-US" altLang="ko-KR" sz="1100" dirty="0" smtClean="0"/>
+              <a:t>	</a:t>
+            </a:r>
+            <a:r>
+              <a:rPr lang="ko-KR" altLang="en-US" sz="1100" dirty="0" smtClean="0"/>
+              <a:t>상품명</a:t>
+            </a:r>
+            <a:endParaRPr lang="ko-KR" altLang="en-US" sz="1100" dirty="0"/>
+          </a:p>
+        </p:txBody>
+      </p:sp>
+      <p:cxnSp>
+        <p:nvCxnSpPr>
+          <p:cNvPr id="13" name="직선 연결선 12"/>
+          <p:cNvCxnSpPr/>
+          <p:nvPr/>
+        </p:nvCxnSpPr>
+        <p:spPr>
+          <a:xfrm>
+            <a:off x="395536" y="2420888"/>
+            <a:ext cx="2664296" cy="0"/>
+          </a:xfrm>
+          <a:prstGeom prst="line">
+            <a:avLst/>
+          </a:prstGeom>
+          <a:ln>
+            <a:solidFill>
+              <a:schemeClr val="bg1">
+                <a:lumMod val="65000"/>
+              </a:schemeClr>
+            </a:solidFill>
+          </a:ln>
+        </p:spPr>
+        <p:style>
+          <a:lnRef idx="1">
+            <a:schemeClr val="accent1"/>
+          </a:lnRef>
+          <a:fillRef idx="0">
+            <a:schemeClr val="accent1"/>
+          </a:fillRef>
+          <a:effectRef idx="0">
+            <a:schemeClr val="accent1"/>
+          </a:effectRef>
+          <a:fontRef idx="minor">
+            <a:schemeClr val="tx1"/>
+          </a:fontRef>
+        </p:style>
+      </p:cxnSp>
+      <p:cxnSp>
+        <p:nvCxnSpPr>
+          <p:cNvPr id="14" name="직선 연결선 13"/>
+          <p:cNvCxnSpPr/>
+          <p:nvPr/>
+        </p:nvCxnSpPr>
+        <p:spPr>
+          <a:xfrm>
+            <a:off x="395536" y="2852936"/>
+            <a:ext cx="2664296" cy="0"/>
+          </a:xfrm>
+          <a:prstGeom prst="line">
+            <a:avLst/>
+          </a:prstGeom>
+          <a:ln>
+            <a:solidFill>
+              <a:schemeClr val="bg1">
+                <a:lumMod val="65000"/>
+              </a:schemeClr>
+            </a:solidFill>
+          </a:ln>
+        </p:spPr>
+        <p:style>
+          <a:lnRef idx="1">
+            <a:schemeClr val="accent1"/>
+          </a:lnRef>
+          <a:fillRef idx="0">
+            <a:schemeClr val="accent1"/>
+          </a:fillRef>
+          <a:effectRef idx="0">
+            <a:schemeClr val="accent1"/>
+          </a:effectRef>
+          <a:fontRef idx="minor">
+            <a:schemeClr val="tx1"/>
+          </a:fontRef>
+        </p:style>
+      </p:cxnSp>
+      <p:cxnSp>
+        <p:nvCxnSpPr>
+          <p:cNvPr id="15" name="직선 연결선 14"/>
+          <p:cNvCxnSpPr/>
+          <p:nvPr/>
+        </p:nvCxnSpPr>
+        <p:spPr>
+          <a:xfrm>
+            <a:off x="395536" y="3284984"/>
+            <a:ext cx="2664296" cy="0"/>
+          </a:xfrm>
+          <a:prstGeom prst="line">
+            <a:avLst/>
+          </a:prstGeom>
+          <a:ln>
+            <a:solidFill>
+              <a:schemeClr val="bg1">
+                <a:lumMod val="65000"/>
+              </a:schemeClr>
+            </a:solidFill>
+          </a:ln>
+        </p:spPr>
+        <p:style>
+          <a:lnRef idx="1">
+            <a:schemeClr val="accent1"/>
+          </a:lnRef>
+          <a:fillRef idx="0">
+            <a:schemeClr val="accent1"/>
+          </a:fillRef>
+          <a:effectRef idx="0">
+            <a:schemeClr val="accent1"/>
+          </a:effectRef>
+          <a:fontRef idx="minor">
+            <a:schemeClr val="tx1"/>
+          </a:fontRef>
+        </p:style>
+      </p:cxnSp>
+      <p:cxnSp>
+        <p:nvCxnSpPr>
+          <p:cNvPr id="16" name="직선 연결선 15"/>
+          <p:cNvCxnSpPr/>
+          <p:nvPr/>
+        </p:nvCxnSpPr>
+        <p:spPr>
+          <a:xfrm>
+            <a:off x="395536" y="3717032"/>
+            <a:ext cx="2664296" cy="0"/>
+          </a:xfrm>
+          <a:prstGeom prst="line">
+            <a:avLst/>
+          </a:prstGeom>
+          <a:ln>
+            <a:solidFill>
+              <a:schemeClr val="bg1">
+                <a:lumMod val="65000"/>
+              </a:schemeClr>
+            </a:solidFill>
+          </a:ln>
+        </p:spPr>
+        <p:style>
+          <a:lnRef idx="1">
+            <a:schemeClr val="accent1"/>
+          </a:lnRef>
+          <a:fillRef idx="0">
+            <a:schemeClr val="accent1"/>
+          </a:fillRef>
+          <a:effectRef idx="0">
+            <a:schemeClr val="accent1"/>
+          </a:effectRef>
+          <a:fontRef idx="minor">
+            <a:schemeClr val="tx1"/>
+          </a:fontRef>
+        </p:style>
+      </p:cxnSp>
+      <p:cxnSp>
+        <p:nvCxnSpPr>
+          <p:cNvPr id="17" name="직선 연결선 16"/>
+          <p:cNvCxnSpPr/>
+          <p:nvPr/>
+        </p:nvCxnSpPr>
+        <p:spPr>
+          <a:xfrm>
+            <a:off x="395536" y="4149080"/>
+            <a:ext cx="2664296" cy="0"/>
+          </a:xfrm>
+          <a:prstGeom prst="line">
+            <a:avLst/>
+          </a:prstGeom>
+          <a:ln>
+            <a:solidFill>
+              <a:schemeClr val="bg1">
+                <a:lumMod val="65000"/>
+              </a:schemeClr>
+            </a:solidFill>
+          </a:ln>
+        </p:spPr>
+        <p:style>
+          <a:lnRef idx="1">
+            <a:schemeClr val="accent1"/>
+          </a:lnRef>
+          <a:fillRef idx="0">
+            <a:schemeClr val="accent1"/>
+          </a:fillRef>
+          <a:effectRef idx="0">
+            <a:schemeClr val="accent1"/>
+          </a:effectRef>
+          <a:fontRef idx="minor">
+            <a:schemeClr val="tx1"/>
+          </a:fontRef>
+        </p:style>
+      </p:cxnSp>
+      <p:cxnSp>
+        <p:nvCxnSpPr>
+          <p:cNvPr id="18" name="직선 연결선 17"/>
+          <p:cNvCxnSpPr/>
+          <p:nvPr/>
+        </p:nvCxnSpPr>
+        <p:spPr>
+          <a:xfrm>
+            <a:off x="395536" y="4653136"/>
+            <a:ext cx="2664296" cy="0"/>
+          </a:xfrm>
+          <a:prstGeom prst="line">
+            <a:avLst/>
+          </a:prstGeom>
+          <a:ln>
+            <a:solidFill>
+              <a:schemeClr val="bg1">
+                <a:lumMod val="65000"/>
+              </a:schemeClr>
+            </a:solidFill>
+          </a:ln>
+        </p:spPr>
+        <p:style>
+          <a:lnRef idx="1">
+            <a:schemeClr val="accent1"/>
+          </a:lnRef>
+          <a:fillRef idx="0">
+            <a:schemeClr val="accent1"/>
+          </a:fillRef>
+          <a:effectRef idx="0">
+            <a:schemeClr val="accent1"/>
+          </a:effectRef>
+          <a:fontRef idx="minor">
+            <a:schemeClr val="tx1"/>
+          </a:fontRef>
+        </p:style>
+      </p:cxnSp>
+      <p:sp>
+        <p:nvSpPr>
+          <p:cNvPr id="19" name="TextBox 18"/>
+          <p:cNvSpPr txBox="1"/>
+          <p:nvPr/>
+        </p:nvSpPr>
+        <p:spPr>
+          <a:xfrm>
+            <a:off x="683568" y="2492896"/>
+            <a:ext cx="1728192" cy="230832"/>
+          </a:xfrm>
+          <a:prstGeom prst="rect">
+            <a:avLst/>
+          </a:prstGeom>
+          <a:noFill/>
+        </p:spPr>
+        <p:txBody>
+          <a:bodyPr wrap="square" rtlCol="0">
+            <a:spAutoFit/>
+          </a:bodyPr>
+          <a:lstStyle/>
+          <a:p>
+            <a:r>
+              <a:rPr lang="en-US" altLang="ko-KR" sz="900" dirty="0" err="1" smtClean="0"/>
+              <a:t>yyyy.mm.dd</a:t>
+            </a:r>
+            <a:r>
+              <a:rPr lang="en-US" altLang="ko-KR" sz="900" dirty="0" smtClean="0"/>
+              <a:t> 	 </a:t>
+            </a:r>
+            <a:r>
+              <a:rPr lang="ko-KR" altLang="en-US" sz="900" dirty="0" smtClean="0"/>
+              <a:t>상품 이름</a:t>
+            </a:r>
+            <a:endParaRPr lang="ko-KR" altLang="en-US" sz="900" dirty="0"/>
+          </a:p>
+        </p:txBody>
+      </p:sp>
+      <p:sp>
+        <p:nvSpPr>
+          <p:cNvPr id="20" name="직사각형 19"/>
+          <p:cNvSpPr/>
+          <p:nvPr/>
+        </p:nvSpPr>
+        <p:spPr>
+          <a:xfrm>
+            <a:off x="467544" y="2492896"/>
+            <a:ext cx="216024" cy="216024"/>
+          </a:xfrm>
+          <a:prstGeom prst="rect">
+            <a:avLst/>
+          </a:prstGeom>
+          <a:ln w="3175"/>
+        </p:spPr>
+        <p:style>
+          <a:lnRef idx="2">
+            <a:schemeClr val="dk1"/>
+          </a:lnRef>
+          <a:fillRef idx="1">
+            <a:schemeClr val="lt1"/>
+          </a:fillRef>
+          <a:effectRef idx="0">
+            <a:schemeClr val="dk1"/>
+          </a:effectRef>
+          <a:fontRef idx="minor">
+            <a:schemeClr val="dk1"/>
+          </a:fontRef>
+        </p:style>
+        <p:txBody>
+          <a:bodyPr rtlCol="0" anchor="ctr"/>
+          <a:lstStyle/>
+          <a:p>
+            <a:pPr algn="ctr"/>
+            <a:endParaRPr lang="ko-KR" altLang="en-US"/>
+          </a:p>
+        </p:txBody>
+      </p:sp>
+      <p:sp>
+        <p:nvSpPr>
+          <p:cNvPr id="21" name="직사각형 20"/>
+          <p:cNvSpPr/>
+          <p:nvPr/>
+        </p:nvSpPr>
+        <p:spPr>
+          <a:xfrm>
+            <a:off x="2411760" y="5013176"/>
+            <a:ext cx="504056" cy="360040"/>
+          </a:xfrm>
+          <a:prstGeom prst="rect">
+            <a:avLst/>
+          </a:prstGeom>
+        </p:spPr>
+        <p:style>
+          <a:lnRef idx="2">
+            <a:schemeClr val="accent2">
+              <a:shade val="50000"/>
+            </a:schemeClr>
+          </a:lnRef>
+          <a:fillRef idx="1">
+            <a:schemeClr val="accent2"/>
+          </a:fillRef>
+          <a:effectRef idx="0">
+            <a:schemeClr val="accent2"/>
+          </a:effectRef>
+          <a:fontRef idx="minor">
+            <a:schemeClr val="lt1"/>
+          </a:fontRef>
+        </p:style>
+        <p:txBody>
+          <a:bodyPr rtlCol="0" anchor="ctr"/>
+          <a:lstStyle/>
+          <a:p>
+            <a:pPr algn="ctr"/>
+            <a:r>
+              <a:rPr lang="ko-KR" altLang="en-US" sz="1100" dirty="0" smtClean="0"/>
+              <a:t>삭제</a:t>
+            </a:r>
+            <a:endParaRPr lang="ko-KR" altLang="en-US" sz="1100" dirty="0"/>
+          </a:p>
+        </p:txBody>
+      </p:sp>
+      <p:sp>
+        <p:nvSpPr>
+          <p:cNvPr id="22" name="직사각형 21"/>
+          <p:cNvSpPr/>
+          <p:nvPr/>
+        </p:nvSpPr>
+        <p:spPr>
+          <a:xfrm>
+            <a:off x="2411760" y="2492896"/>
+            <a:ext cx="576064" cy="216024"/>
+          </a:xfrm>
+          <a:prstGeom prst="rect">
+            <a:avLst/>
+          </a:prstGeom>
+        </p:spPr>
+        <p:style>
+          <a:lnRef idx="2">
+            <a:schemeClr val="accent1">
+              <a:shade val="50000"/>
+            </a:schemeClr>
+          </a:lnRef>
+          <a:fillRef idx="1">
+            <a:schemeClr val="accent1"/>
+          </a:fillRef>
+          <a:effectRef idx="0">
+            <a:schemeClr val="accent1"/>
+          </a:effectRef>
+          <a:fontRef idx="minor">
+            <a:schemeClr val="lt1"/>
+          </a:fontRef>
+        </p:style>
+        <p:txBody>
+          <a:bodyPr rtlCol="0" anchor="ctr"/>
+          <a:lstStyle/>
+          <a:p>
+            <a:pPr algn="ctr"/>
+            <a:r>
+              <a:rPr lang="ko-KR" altLang="en-US" sz="1000" dirty="0" smtClean="0"/>
+              <a:t>환불</a:t>
+            </a:r>
+            <a:endParaRPr lang="ko-KR" altLang="en-US" sz="1000" dirty="0"/>
+          </a:p>
+        </p:txBody>
+      </p:sp>
+      <p:sp>
+        <p:nvSpPr>
+          <p:cNvPr id="23" name="TextBox 22"/>
+          <p:cNvSpPr txBox="1"/>
+          <p:nvPr/>
+        </p:nvSpPr>
+        <p:spPr>
+          <a:xfrm>
+            <a:off x="683568" y="2924944"/>
+            <a:ext cx="1728192" cy="230832"/>
+          </a:xfrm>
+          <a:prstGeom prst="rect">
+            <a:avLst/>
+          </a:prstGeom>
+          <a:noFill/>
+        </p:spPr>
+        <p:txBody>
+          <a:bodyPr wrap="square" rtlCol="0">
+            <a:spAutoFit/>
+          </a:bodyPr>
+          <a:lstStyle/>
+          <a:p>
+            <a:r>
+              <a:rPr lang="en-US" altLang="ko-KR" sz="900" dirty="0" err="1" smtClean="0"/>
+              <a:t>yyyy.mm.dd</a:t>
+            </a:r>
+            <a:r>
+              <a:rPr lang="en-US" altLang="ko-KR" sz="900" dirty="0" smtClean="0"/>
+              <a:t> 	 </a:t>
+            </a:r>
+            <a:r>
+              <a:rPr lang="ko-KR" altLang="en-US" sz="900" dirty="0" smtClean="0"/>
+              <a:t>상품 이름</a:t>
+            </a:r>
+            <a:endParaRPr lang="ko-KR" altLang="en-US" sz="900" dirty="0"/>
+          </a:p>
+        </p:txBody>
+      </p:sp>
+      <p:sp>
+        <p:nvSpPr>
+          <p:cNvPr id="24" name="직사각형 23"/>
+          <p:cNvSpPr/>
+          <p:nvPr/>
+        </p:nvSpPr>
+        <p:spPr>
+          <a:xfrm>
+            <a:off x="467544" y="2924944"/>
+            <a:ext cx="216024" cy="216024"/>
+          </a:xfrm>
+          <a:prstGeom prst="rect">
+            <a:avLst/>
+          </a:prstGeom>
+          <a:ln w="3175"/>
+        </p:spPr>
+        <p:style>
+          <a:lnRef idx="2">
+            <a:schemeClr val="dk1"/>
+          </a:lnRef>
+          <a:fillRef idx="1">
+            <a:schemeClr val="lt1"/>
+          </a:fillRef>
+          <a:effectRef idx="0">
+            <a:schemeClr val="dk1"/>
+          </a:effectRef>
+          <a:fontRef idx="minor">
+            <a:schemeClr val="dk1"/>
+          </a:fontRef>
+        </p:style>
+        <p:txBody>
+          <a:bodyPr rtlCol="0" anchor="ctr"/>
+          <a:lstStyle/>
+          <a:p>
+            <a:pPr algn="ctr"/>
+            <a:endParaRPr lang="ko-KR" altLang="en-US"/>
+          </a:p>
+        </p:txBody>
+      </p:sp>
+      <p:sp>
+        <p:nvSpPr>
+          <p:cNvPr id="25" name="직사각형 24"/>
+          <p:cNvSpPr/>
+          <p:nvPr/>
+        </p:nvSpPr>
+        <p:spPr>
+          <a:xfrm>
+            <a:off x="2411760" y="2924944"/>
+            <a:ext cx="576064" cy="216024"/>
+          </a:xfrm>
+          <a:prstGeom prst="rect">
+            <a:avLst/>
+          </a:prstGeom>
+        </p:spPr>
+        <p:style>
+          <a:lnRef idx="2">
+            <a:schemeClr val="accent1">
+              <a:shade val="50000"/>
+            </a:schemeClr>
+          </a:lnRef>
+          <a:fillRef idx="1">
+            <a:schemeClr val="accent1"/>
+          </a:fillRef>
+          <a:effectRef idx="0">
+            <a:schemeClr val="accent1"/>
+          </a:effectRef>
+          <a:fontRef idx="minor">
+            <a:schemeClr val="lt1"/>
+          </a:fontRef>
+        </p:style>
+        <p:txBody>
+          <a:bodyPr rtlCol="0" anchor="ctr"/>
+          <a:lstStyle/>
+          <a:p>
+            <a:pPr algn="ctr"/>
+            <a:r>
+              <a:rPr lang="ko-KR" altLang="en-US" sz="1000" dirty="0" smtClean="0"/>
+              <a:t>환불</a:t>
+            </a:r>
+            <a:endParaRPr lang="ko-KR" altLang="en-US" sz="1000" dirty="0"/>
+          </a:p>
+        </p:txBody>
+      </p:sp>
+      <p:sp>
+        <p:nvSpPr>
+          <p:cNvPr id="26" name="TextBox 25"/>
+          <p:cNvSpPr txBox="1"/>
+          <p:nvPr/>
+        </p:nvSpPr>
+        <p:spPr>
+          <a:xfrm>
+            <a:off x="683568" y="3356992"/>
+            <a:ext cx="1728192" cy="230832"/>
+          </a:xfrm>
+          <a:prstGeom prst="rect">
+            <a:avLst/>
+          </a:prstGeom>
+          <a:noFill/>
+        </p:spPr>
+        <p:txBody>
+          <a:bodyPr wrap="square" rtlCol="0">
+            <a:spAutoFit/>
+          </a:bodyPr>
+          <a:lstStyle/>
+          <a:p>
+            <a:r>
+              <a:rPr lang="en-US" altLang="ko-KR" sz="900" dirty="0" err="1" smtClean="0"/>
+              <a:t>yyyy.mm.dd</a:t>
+            </a:r>
+            <a:r>
+              <a:rPr lang="en-US" altLang="ko-KR" sz="900" dirty="0" smtClean="0"/>
+              <a:t> 	 </a:t>
+            </a:r>
+            <a:r>
+              <a:rPr lang="ko-KR" altLang="en-US" sz="900" dirty="0" smtClean="0"/>
+              <a:t>상품 이름</a:t>
+            </a:r>
+            <a:endParaRPr lang="ko-KR" altLang="en-US" sz="900" dirty="0"/>
+          </a:p>
+        </p:txBody>
+      </p:sp>
+      <p:sp>
+        <p:nvSpPr>
+          <p:cNvPr id="27" name="직사각형 26"/>
+          <p:cNvSpPr/>
+          <p:nvPr/>
+        </p:nvSpPr>
+        <p:spPr>
+          <a:xfrm>
+            <a:off x="467544" y="3356992"/>
+            <a:ext cx="216024" cy="216024"/>
+          </a:xfrm>
+          <a:prstGeom prst="rect">
+            <a:avLst/>
+          </a:prstGeom>
+          <a:ln w="3175"/>
+        </p:spPr>
+        <p:style>
+          <a:lnRef idx="2">
+            <a:schemeClr val="dk1"/>
+          </a:lnRef>
+          <a:fillRef idx="1">
+            <a:schemeClr val="lt1"/>
+          </a:fillRef>
+          <a:effectRef idx="0">
+            <a:schemeClr val="dk1"/>
+          </a:effectRef>
+          <a:fontRef idx="minor">
+            <a:schemeClr val="dk1"/>
+          </a:fontRef>
+        </p:style>
+        <p:txBody>
+          <a:bodyPr rtlCol="0" anchor="ctr"/>
+          <a:lstStyle/>
+          <a:p>
+            <a:pPr algn="ctr"/>
+            <a:endParaRPr lang="ko-KR" altLang="en-US"/>
+          </a:p>
+        </p:txBody>
+      </p:sp>
+      <p:sp>
+        <p:nvSpPr>
+          <p:cNvPr id="28" name="직사각형 27"/>
+          <p:cNvSpPr/>
+          <p:nvPr/>
+        </p:nvSpPr>
+        <p:spPr>
+          <a:xfrm>
+            <a:off x="2411760" y="3356992"/>
+            <a:ext cx="576064" cy="216024"/>
+          </a:xfrm>
+          <a:prstGeom prst="rect">
+            <a:avLst/>
+          </a:prstGeom>
+        </p:spPr>
+        <p:style>
+          <a:lnRef idx="2">
+            <a:schemeClr val="accent1">
+              <a:shade val="50000"/>
+            </a:schemeClr>
+          </a:lnRef>
+          <a:fillRef idx="1">
+            <a:schemeClr val="accent1"/>
+          </a:fillRef>
+          <a:effectRef idx="0">
+            <a:schemeClr val="accent1"/>
+          </a:effectRef>
+          <a:fontRef idx="minor">
+            <a:schemeClr val="lt1"/>
+          </a:fontRef>
+        </p:style>
+        <p:txBody>
+          <a:bodyPr rtlCol="0" anchor="ctr"/>
+          <a:lstStyle/>
+          <a:p>
+            <a:pPr algn="ctr"/>
+            <a:r>
+              <a:rPr lang="ko-KR" altLang="en-US" sz="1000" dirty="0" smtClean="0"/>
+              <a:t>환불</a:t>
+            </a:r>
+            <a:endParaRPr lang="ko-KR" altLang="en-US" sz="1000" dirty="0"/>
+          </a:p>
+        </p:txBody>
+      </p:sp>
+      <p:sp>
+        <p:nvSpPr>
+          <p:cNvPr id="29" name="TextBox 28"/>
+          <p:cNvSpPr txBox="1"/>
+          <p:nvPr/>
+        </p:nvSpPr>
+        <p:spPr>
+          <a:xfrm>
+            <a:off x="683568" y="3789040"/>
+            <a:ext cx="1728192" cy="230832"/>
+          </a:xfrm>
+          <a:prstGeom prst="rect">
+            <a:avLst/>
+          </a:prstGeom>
+          <a:noFill/>
+        </p:spPr>
+        <p:txBody>
+          <a:bodyPr wrap="square" rtlCol="0">
+            <a:spAutoFit/>
+          </a:bodyPr>
+          <a:lstStyle/>
+          <a:p>
+            <a:r>
+              <a:rPr lang="en-US" altLang="ko-KR" sz="900" dirty="0" err="1" smtClean="0"/>
+              <a:t>yyyy.mm.dd</a:t>
+            </a:r>
+            <a:r>
+              <a:rPr lang="en-US" altLang="ko-KR" sz="900" dirty="0" smtClean="0"/>
+              <a:t> 	 </a:t>
+            </a:r>
+            <a:r>
+              <a:rPr lang="ko-KR" altLang="en-US" sz="900" dirty="0" smtClean="0"/>
+              <a:t>상품 이름</a:t>
+            </a:r>
+            <a:endParaRPr lang="ko-KR" altLang="en-US" sz="900" dirty="0"/>
+          </a:p>
+        </p:txBody>
+      </p:sp>
+      <p:sp>
+        <p:nvSpPr>
+          <p:cNvPr id="30" name="직사각형 29"/>
+          <p:cNvSpPr/>
+          <p:nvPr/>
+        </p:nvSpPr>
+        <p:spPr>
+          <a:xfrm>
+            <a:off x="467544" y="3789040"/>
+            <a:ext cx="216024" cy="216024"/>
+          </a:xfrm>
+          <a:prstGeom prst="rect">
+            <a:avLst/>
+          </a:prstGeom>
+          <a:ln w="3175"/>
+        </p:spPr>
+        <p:style>
+          <a:lnRef idx="2">
+            <a:schemeClr val="dk1"/>
+          </a:lnRef>
+          <a:fillRef idx="1">
+            <a:schemeClr val="lt1"/>
+          </a:fillRef>
+          <a:effectRef idx="0">
+            <a:schemeClr val="dk1"/>
+          </a:effectRef>
+          <a:fontRef idx="minor">
+            <a:schemeClr val="dk1"/>
+          </a:fontRef>
+        </p:style>
+        <p:txBody>
+          <a:bodyPr rtlCol="0" anchor="ctr"/>
+          <a:lstStyle/>
+          <a:p>
+            <a:pPr algn="ctr"/>
+            <a:endParaRPr lang="ko-KR" altLang="en-US"/>
+          </a:p>
+        </p:txBody>
+      </p:sp>
+      <p:sp>
+        <p:nvSpPr>
+          <p:cNvPr id="31" name="직사각형 30"/>
+          <p:cNvSpPr/>
+          <p:nvPr/>
+        </p:nvSpPr>
+        <p:spPr>
+          <a:xfrm>
+            <a:off x="2411760" y="3789040"/>
+            <a:ext cx="576064" cy="216024"/>
+          </a:xfrm>
+          <a:prstGeom prst="rect">
+            <a:avLst/>
+          </a:prstGeom>
+        </p:spPr>
+        <p:style>
+          <a:lnRef idx="2">
+            <a:schemeClr val="accent1">
+              <a:shade val="50000"/>
+            </a:schemeClr>
+          </a:lnRef>
+          <a:fillRef idx="1">
+            <a:schemeClr val="accent1"/>
+          </a:fillRef>
+          <a:effectRef idx="0">
+            <a:schemeClr val="accent1"/>
+          </a:effectRef>
+          <a:fontRef idx="minor">
+            <a:schemeClr val="lt1"/>
+          </a:fontRef>
+        </p:style>
+        <p:txBody>
+          <a:bodyPr rtlCol="0" anchor="ctr"/>
+          <a:lstStyle/>
+          <a:p>
+            <a:pPr algn="ctr"/>
+            <a:r>
+              <a:rPr lang="ko-KR" altLang="en-US" sz="1000" dirty="0" smtClean="0"/>
+              <a:t>환불</a:t>
+            </a:r>
+            <a:endParaRPr lang="ko-KR" altLang="en-US" sz="1000" dirty="0"/>
+          </a:p>
+        </p:txBody>
+      </p:sp>
+      <p:sp>
+        <p:nvSpPr>
+          <p:cNvPr id="32" name="TextBox 31"/>
+          <p:cNvSpPr txBox="1"/>
+          <p:nvPr/>
+        </p:nvSpPr>
+        <p:spPr>
+          <a:xfrm>
+            <a:off x="683568" y="4293096"/>
+            <a:ext cx="1728192" cy="230832"/>
+          </a:xfrm>
+          <a:prstGeom prst="rect">
+            <a:avLst/>
+          </a:prstGeom>
+          <a:noFill/>
+        </p:spPr>
+        <p:txBody>
+          <a:bodyPr wrap="square" rtlCol="0">
+            <a:spAutoFit/>
+          </a:bodyPr>
+          <a:lstStyle/>
+          <a:p>
+            <a:r>
+              <a:rPr lang="en-US" altLang="ko-KR" sz="900" dirty="0" err="1" smtClean="0"/>
+              <a:t>yyyy.mm.dd</a:t>
+            </a:r>
+            <a:r>
+              <a:rPr lang="en-US" altLang="ko-KR" sz="900" dirty="0" smtClean="0"/>
+              <a:t> 	 </a:t>
+            </a:r>
+            <a:r>
+              <a:rPr lang="ko-KR" altLang="en-US" sz="900" dirty="0" smtClean="0"/>
+              <a:t>상품 이름</a:t>
+            </a:r>
+            <a:endParaRPr lang="ko-KR" altLang="en-US" sz="900" dirty="0"/>
+          </a:p>
+        </p:txBody>
+      </p:sp>
+      <p:sp>
+        <p:nvSpPr>
+          <p:cNvPr id="33" name="직사각형 32"/>
+          <p:cNvSpPr/>
+          <p:nvPr/>
+        </p:nvSpPr>
+        <p:spPr>
+          <a:xfrm>
+            <a:off x="467544" y="4293096"/>
+            <a:ext cx="216024" cy="216024"/>
+          </a:xfrm>
+          <a:prstGeom prst="rect">
+            <a:avLst/>
+          </a:prstGeom>
+          <a:ln w="3175"/>
+        </p:spPr>
+        <p:style>
+          <a:lnRef idx="2">
+            <a:schemeClr val="dk1"/>
+          </a:lnRef>
+          <a:fillRef idx="1">
+            <a:schemeClr val="lt1"/>
+          </a:fillRef>
+          <a:effectRef idx="0">
+            <a:schemeClr val="dk1"/>
+          </a:effectRef>
+          <a:fontRef idx="minor">
+            <a:schemeClr val="dk1"/>
+          </a:fontRef>
+        </p:style>
+        <p:txBody>
+          <a:bodyPr rtlCol="0" anchor="ctr"/>
+          <a:lstStyle/>
+          <a:p>
+            <a:pPr algn="ctr"/>
+            <a:endParaRPr lang="ko-KR" altLang="en-US"/>
+          </a:p>
+        </p:txBody>
+      </p:sp>
+      <p:sp>
+        <p:nvSpPr>
+          <p:cNvPr id="34" name="직사각형 33"/>
+          <p:cNvSpPr/>
+          <p:nvPr/>
+        </p:nvSpPr>
+        <p:spPr>
+          <a:xfrm>
+            <a:off x="2411760" y="4293096"/>
+            <a:ext cx="576064" cy="216024"/>
+          </a:xfrm>
+          <a:prstGeom prst="rect">
+            <a:avLst/>
+          </a:prstGeom>
+        </p:spPr>
+        <p:style>
+          <a:lnRef idx="2">
+            <a:schemeClr val="accent1">
+              <a:shade val="50000"/>
+            </a:schemeClr>
+          </a:lnRef>
+          <a:fillRef idx="1">
+            <a:schemeClr val="accent1"/>
+          </a:fillRef>
+          <a:effectRef idx="0">
+            <a:schemeClr val="accent1"/>
+          </a:effectRef>
+          <a:fontRef idx="minor">
+            <a:schemeClr val="lt1"/>
+          </a:fontRef>
+        </p:style>
+        <p:txBody>
+          <a:bodyPr rtlCol="0" anchor="ctr"/>
+          <a:lstStyle/>
+          <a:p>
+            <a:pPr algn="ctr"/>
+            <a:r>
+              <a:rPr lang="ko-KR" altLang="en-US" sz="1000" dirty="0" smtClean="0"/>
+              <a:t>환불</a:t>
+            </a:r>
+            <a:endParaRPr lang="ko-KR" altLang="en-US" sz="1000" dirty="0"/>
+          </a:p>
+        </p:txBody>
+      </p:sp>
+      <p:sp>
+        <p:nvSpPr>
+          <p:cNvPr id="35" name="직사각형 34"/>
+          <p:cNvSpPr/>
+          <p:nvPr/>
+        </p:nvSpPr>
+        <p:spPr>
+          <a:xfrm>
+            <a:off x="467544" y="2492896"/>
+            <a:ext cx="216024" cy="216024"/>
+          </a:xfrm>
+          <a:prstGeom prst="rect">
+            <a:avLst/>
+          </a:prstGeom>
+          <a:ln/>
+        </p:spPr>
+        <p:style>
+          <a:lnRef idx="2">
+            <a:schemeClr val="dk1">
+              <a:shade val="50000"/>
+            </a:schemeClr>
+          </a:lnRef>
+          <a:fillRef idx="1">
+            <a:schemeClr val="dk1"/>
+          </a:fillRef>
+          <a:effectRef idx="0">
+            <a:schemeClr val="dk1"/>
+          </a:effectRef>
+          <a:fontRef idx="minor">
+            <a:schemeClr val="lt1"/>
+          </a:fontRef>
+        </p:style>
+        <p:txBody>
+          <a:bodyPr rtlCol="0" anchor="ctr"/>
+          <a:lstStyle/>
+          <a:p>
+            <a:pPr algn="ctr"/>
+            <a:endParaRPr lang="ko-KR" altLang="en-US"/>
+          </a:p>
+        </p:txBody>
+      </p:sp>
+      <p:sp>
+        <p:nvSpPr>
+          <p:cNvPr id="37" name="직사각형 36"/>
+          <p:cNvSpPr/>
+          <p:nvPr/>
+        </p:nvSpPr>
+        <p:spPr>
+          <a:xfrm>
+            <a:off x="611560" y="2708920"/>
+            <a:ext cx="2160240" cy="1440160"/>
+          </a:xfrm>
+          <a:prstGeom prst="rect">
+            <a:avLst/>
+          </a:prstGeom>
+        </p:spPr>
+        <p:style>
+          <a:lnRef idx="2">
+            <a:schemeClr val="dk1"/>
+          </a:lnRef>
+          <a:fillRef idx="1">
+            <a:schemeClr val="lt1"/>
+          </a:fillRef>
+          <a:effectRef idx="0">
+            <a:schemeClr val="dk1"/>
+          </a:effectRef>
+          <a:fontRef idx="minor">
+            <a:schemeClr val="dk1"/>
+          </a:fontRef>
+        </p:style>
+        <p:txBody>
+          <a:bodyPr rtlCol="0" anchor="ctr"/>
+          <a:lstStyle/>
+          <a:p>
+            <a:pPr algn="ctr"/>
+            <a:endParaRPr lang="ko-KR" altLang="en-US"/>
+          </a:p>
+        </p:txBody>
+      </p:sp>
+      <p:cxnSp>
+        <p:nvCxnSpPr>
+          <p:cNvPr id="38" name="직선 연결선 37"/>
+          <p:cNvCxnSpPr/>
+          <p:nvPr/>
+        </p:nvCxnSpPr>
+        <p:spPr>
+          <a:xfrm>
+            <a:off x="611560" y="2996952"/>
+            <a:ext cx="2160240" cy="0"/>
+          </a:xfrm>
+          <a:prstGeom prst="line">
+            <a:avLst/>
+          </a:prstGeom>
+          <a:ln w="19050"/>
+        </p:spPr>
+        <p:style>
+          <a:lnRef idx="1">
+            <a:schemeClr val="dk1"/>
+          </a:lnRef>
+          <a:fillRef idx="0">
+            <a:schemeClr val="dk1"/>
+          </a:fillRef>
+          <a:effectRef idx="0">
+            <a:schemeClr val="dk1"/>
+          </a:effectRef>
+          <a:fontRef idx="minor">
+            <a:schemeClr val="tx1"/>
+          </a:fontRef>
+        </p:style>
+      </p:cxnSp>
+      <p:sp>
+        <p:nvSpPr>
+          <p:cNvPr id="39" name="타원 38"/>
+          <p:cNvSpPr/>
+          <p:nvPr/>
+        </p:nvSpPr>
+        <p:spPr>
+          <a:xfrm>
+            <a:off x="2555776" y="2780928"/>
+            <a:ext cx="144016" cy="144016"/>
+          </a:xfrm>
+          <a:prstGeom prst="ellipse">
+            <a:avLst/>
+          </a:prstGeom>
+          <a:ln/>
+        </p:spPr>
+        <p:style>
+          <a:lnRef idx="2">
+            <a:schemeClr val="accent2">
+              <a:shade val="50000"/>
+            </a:schemeClr>
+          </a:lnRef>
+          <a:fillRef idx="1">
+            <a:schemeClr val="accent2"/>
+          </a:fillRef>
+          <a:effectRef idx="0">
+            <a:schemeClr val="accent2"/>
+          </a:effectRef>
+          <a:fontRef idx="minor">
+            <a:schemeClr val="lt1"/>
+          </a:fontRef>
+        </p:style>
+        <p:txBody>
+          <a:bodyPr rtlCol="0" anchor="ctr"/>
+          <a:lstStyle/>
+          <a:p>
+            <a:pPr algn="ctr"/>
+            <a:endParaRPr lang="ko-KR" altLang="en-US"/>
+          </a:p>
+        </p:txBody>
+      </p:sp>
+      <p:sp>
+        <p:nvSpPr>
+          <p:cNvPr id="40" name="TextBox 39"/>
+          <p:cNvSpPr txBox="1"/>
+          <p:nvPr/>
+        </p:nvSpPr>
+        <p:spPr>
+          <a:xfrm>
+            <a:off x="611560" y="2708920"/>
+            <a:ext cx="1728192" cy="276999"/>
+          </a:xfrm>
+          <a:prstGeom prst="rect">
+            <a:avLst/>
+          </a:prstGeom>
+          <a:noFill/>
+        </p:spPr>
+        <p:txBody>
+          <a:bodyPr wrap="square" rtlCol="0">
+            <a:spAutoFit/>
+          </a:bodyPr>
+          <a:lstStyle/>
+          <a:p>
+            <a:r>
+              <a:rPr lang="ko-KR" altLang="en-US" sz="1200" smtClean="0"/>
+              <a:t>상품 만족도 평가</a:t>
+            </a:r>
+            <a:endParaRPr lang="ko-KR" altLang="en-US" sz="1200" dirty="0"/>
+          </a:p>
+        </p:txBody>
+      </p:sp>
+      <p:sp>
+        <p:nvSpPr>
+          <p:cNvPr id="44" name="TextBox 43"/>
+          <p:cNvSpPr txBox="1"/>
+          <p:nvPr/>
+        </p:nvSpPr>
+        <p:spPr>
+          <a:xfrm>
+            <a:off x="683568" y="2996952"/>
+            <a:ext cx="1944216" cy="430887"/>
+          </a:xfrm>
+          <a:prstGeom prst="rect">
+            <a:avLst/>
+          </a:prstGeom>
+          <a:noFill/>
+        </p:spPr>
+        <p:txBody>
+          <a:bodyPr wrap="square" rtlCol="0">
+            <a:spAutoFit/>
+          </a:bodyPr>
+          <a:lstStyle/>
+          <a:p>
+            <a:r>
+              <a:rPr lang="ko-KR" altLang="en-US" sz="1100" dirty="0" smtClean="0"/>
+              <a:t>상품 만족도를 평가해 주십시오</a:t>
+            </a:r>
+            <a:r>
+              <a:rPr lang="en-US" altLang="ko-KR" sz="1100" dirty="0" smtClean="0"/>
+              <a:t>.</a:t>
+            </a:r>
+            <a:endParaRPr lang="ko-KR" altLang="en-US" sz="1100" dirty="0"/>
+          </a:p>
+        </p:txBody>
+      </p:sp>
+      <p:sp>
+        <p:nvSpPr>
+          <p:cNvPr id="45" name="포인트가 5개인 별 44"/>
+          <p:cNvSpPr/>
+          <p:nvPr/>
+        </p:nvSpPr>
+        <p:spPr>
+          <a:xfrm>
+            <a:off x="827584" y="3645024"/>
+            <a:ext cx="216024" cy="216024"/>
+          </a:xfrm>
+          <a:prstGeom prst="star5">
+            <a:avLst/>
+          </a:prstGeom>
+          <a:solidFill>
+            <a:srgbClr val="FFFF00"/>
+          </a:solidFill>
+          <a:ln w="6350">
+            <a:solidFill>
+              <a:schemeClr val="tx1"/>
+            </a:solidFill>
+          </a:ln>
+        </p:spPr>
+        <p:style>
+          <a:lnRef idx="2">
+            <a:schemeClr val="accent1">
+              <a:shade val="50000"/>
+            </a:schemeClr>
+          </a:lnRef>
+          <a:fillRef idx="1">
+            <a:schemeClr val="accent1"/>
+          </a:fillRef>
+          <a:effectRef idx="0">
+            <a:schemeClr val="accent1"/>
+          </a:effectRef>
+          <a:fontRef idx="minor">
+            <a:schemeClr val="lt1"/>
+          </a:fontRef>
+        </p:style>
+        <p:txBody>
+          <a:bodyPr rtlCol="0" anchor="ctr"/>
+          <a:lstStyle/>
+          <a:p>
+            <a:pPr algn="ctr"/>
+            <a:endParaRPr lang="ko-KR" altLang="en-US"/>
+          </a:p>
+        </p:txBody>
+      </p:sp>
+      <p:sp>
+        <p:nvSpPr>
+          <p:cNvPr id="46" name="포인트가 5개인 별 45"/>
+          <p:cNvSpPr/>
+          <p:nvPr/>
+        </p:nvSpPr>
+        <p:spPr>
+          <a:xfrm>
+            <a:off x="1187624" y="3645024"/>
+            <a:ext cx="216024" cy="216024"/>
+          </a:xfrm>
+          <a:prstGeom prst="star5">
+            <a:avLst/>
+          </a:prstGeom>
+          <a:solidFill>
+            <a:srgbClr val="FFFF00"/>
+          </a:solidFill>
+          <a:ln w="6350">
+            <a:solidFill>
+              <a:schemeClr val="tx1"/>
+            </a:solidFill>
+          </a:ln>
+        </p:spPr>
+        <p:style>
+          <a:lnRef idx="2">
+            <a:schemeClr val="accent1">
+              <a:shade val="50000"/>
+            </a:schemeClr>
+          </a:lnRef>
+          <a:fillRef idx="1">
+            <a:schemeClr val="accent1"/>
+          </a:fillRef>
+          <a:effectRef idx="0">
+            <a:schemeClr val="accent1"/>
+          </a:effectRef>
+          <a:fontRef idx="minor">
+            <a:schemeClr val="lt1"/>
+          </a:fontRef>
+        </p:style>
+        <p:txBody>
+          <a:bodyPr rtlCol="0" anchor="ctr"/>
+          <a:lstStyle/>
+          <a:p>
+            <a:pPr algn="ctr"/>
+            <a:endParaRPr lang="ko-KR" altLang="en-US"/>
+          </a:p>
+        </p:txBody>
+      </p:sp>
+      <p:sp>
+        <p:nvSpPr>
+          <p:cNvPr id="47" name="포인트가 5개인 별 46"/>
+          <p:cNvSpPr/>
+          <p:nvPr/>
+        </p:nvSpPr>
+        <p:spPr>
+          <a:xfrm>
+            <a:off x="1547664" y="3645024"/>
+            <a:ext cx="216024" cy="216024"/>
+          </a:xfrm>
+          <a:prstGeom prst="star5">
+            <a:avLst/>
+          </a:prstGeom>
+          <a:solidFill>
+            <a:srgbClr val="FFFF00"/>
+          </a:solidFill>
+          <a:ln w="6350">
+            <a:solidFill>
+              <a:schemeClr val="tx1"/>
+            </a:solidFill>
+          </a:ln>
+        </p:spPr>
+        <p:style>
+          <a:lnRef idx="2">
+            <a:schemeClr val="accent1">
+              <a:shade val="50000"/>
+            </a:schemeClr>
+          </a:lnRef>
+          <a:fillRef idx="1">
+            <a:schemeClr val="accent1"/>
+          </a:fillRef>
+          <a:effectRef idx="0">
+            <a:schemeClr val="accent1"/>
+          </a:effectRef>
+          <a:fontRef idx="minor">
+            <a:schemeClr val="lt1"/>
+          </a:fontRef>
+        </p:style>
+        <p:txBody>
+          <a:bodyPr rtlCol="0" anchor="ctr"/>
+          <a:lstStyle/>
+          <a:p>
+            <a:pPr algn="ctr"/>
+            <a:endParaRPr lang="ko-KR" altLang="en-US"/>
+          </a:p>
+        </p:txBody>
+      </p:sp>
+      <p:sp>
+        <p:nvSpPr>
+          <p:cNvPr id="48" name="포인트가 5개인 별 47"/>
+          <p:cNvSpPr/>
+          <p:nvPr/>
+        </p:nvSpPr>
+        <p:spPr>
+          <a:xfrm>
+            <a:off x="1907704" y="3645024"/>
+            <a:ext cx="216024" cy="216024"/>
+          </a:xfrm>
+          <a:prstGeom prst="star5">
+            <a:avLst/>
+          </a:prstGeom>
+          <a:solidFill>
+            <a:srgbClr val="FFFF00"/>
+          </a:solidFill>
+          <a:ln w="6350">
+            <a:solidFill>
+              <a:schemeClr val="tx1"/>
+            </a:solidFill>
+          </a:ln>
+        </p:spPr>
+        <p:style>
+          <a:lnRef idx="2">
+            <a:schemeClr val="accent1">
+              <a:shade val="50000"/>
+            </a:schemeClr>
+          </a:lnRef>
+          <a:fillRef idx="1">
+            <a:schemeClr val="accent1"/>
+          </a:fillRef>
+          <a:effectRef idx="0">
+            <a:schemeClr val="accent1"/>
+          </a:effectRef>
+          <a:fontRef idx="minor">
+            <a:schemeClr val="lt1"/>
+          </a:fontRef>
+        </p:style>
+        <p:txBody>
+          <a:bodyPr rtlCol="0" anchor="ctr"/>
+          <a:lstStyle/>
+          <a:p>
+            <a:pPr algn="ctr"/>
+            <a:endParaRPr lang="ko-KR" altLang="en-US"/>
+          </a:p>
+        </p:txBody>
+      </p:sp>
+      <p:sp>
+        <p:nvSpPr>
+          <p:cNvPr id="49" name="포인트가 5개인 별 48"/>
+          <p:cNvSpPr/>
+          <p:nvPr/>
+        </p:nvSpPr>
+        <p:spPr>
+          <a:xfrm>
+            <a:off x="2267744" y="3645024"/>
+            <a:ext cx="216024" cy="216024"/>
+          </a:xfrm>
+          <a:prstGeom prst="star5">
+            <a:avLst/>
+          </a:prstGeom>
+          <a:noFill/>
+          <a:ln w="6350">
+            <a:solidFill>
+              <a:schemeClr val="tx1"/>
+            </a:solidFill>
+          </a:ln>
+        </p:spPr>
+        <p:style>
+          <a:lnRef idx="2">
+            <a:schemeClr val="accent1">
+              <a:shade val="50000"/>
+            </a:schemeClr>
+          </a:lnRef>
+          <a:fillRef idx="1">
+            <a:schemeClr val="accent1"/>
+          </a:fillRef>
+          <a:effectRef idx="0">
+            <a:schemeClr val="accent1"/>
+          </a:effectRef>
+          <a:fontRef idx="minor">
+            <a:schemeClr val="lt1"/>
+          </a:fontRef>
+        </p:style>
+        <p:txBody>
+          <a:bodyPr rtlCol="0" anchor="ctr"/>
+          <a:lstStyle/>
+          <a:p>
+            <a:pPr algn="ctr"/>
             <a:endParaRPr lang="ko-KR" altLang="en-US" dirty="0"/>
           </a:p>
         </p:txBody>

</xml_diff>